<commit_message>
modified the licensing slide to reflect this tutorial and finished work on refactoring presentation
</commit_message>
<xml_diff>
--- a/presentations/04-design.pptx
+++ b/presentations/04-design.pptx
@@ -5,41 +5,42 @@
     <p:sldMasterId id="2147483935" r:id="rId4"/>
   </p:sldMasterIdLst>
   <p:notesMasterIdLst>
-    <p:notesMasterId r:id="rId34"/>
+    <p:notesMasterId r:id="rId35"/>
   </p:notesMasterIdLst>
   <p:handoutMasterIdLst>
-    <p:handoutMasterId r:id="rId35"/>
+    <p:handoutMasterId r:id="rId36"/>
   </p:handoutMasterIdLst>
   <p:sldIdLst>
     <p:sldId id="318" r:id="rId5"/>
-    <p:sldId id="320" r:id="rId6"/>
-    <p:sldId id="586" r:id="rId7"/>
-    <p:sldId id="593" r:id="rId8"/>
-    <p:sldId id="610" r:id="rId9"/>
-    <p:sldId id="611" r:id="rId10"/>
-    <p:sldId id="592" r:id="rId11"/>
-    <p:sldId id="594" r:id="rId12"/>
-    <p:sldId id="612" r:id="rId13"/>
-    <p:sldId id="613" r:id="rId14"/>
-    <p:sldId id="562" r:id="rId15"/>
-    <p:sldId id="595" r:id="rId16"/>
-    <p:sldId id="596" r:id="rId17"/>
-    <p:sldId id="597" r:id="rId18"/>
-    <p:sldId id="598" r:id="rId19"/>
-    <p:sldId id="563" r:id="rId20"/>
-    <p:sldId id="605" r:id="rId21"/>
-    <p:sldId id="614" r:id="rId22"/>
-    <p:sldId id="603" r:id="rId23"/>
-    <p:sldId id="604" r:id="rId24"/>
-    <p:sldId id="607" r:id="rId25"/>
-    <p:sldId id="608" r:id="rId26"/>
-    <p:sldId id="601" r:id="rId27"/>
-    <p:sldId id="609" r:id="rId28"/>
-    <p:sldId id="569" r:id="rId29"/>
-    <p:sldId id="602" r:id="rId30"/>
-    <p:sldId id="573" r:id="rId31"/>
-    <p:sldId id="570" r:id="rId32"/>
-    <p:sldId id="571" r:id="rId33"/>
+    <p:sldId id="615" r:id="rId6"/>
+    <p:sldId id="331" r:id="rId7"/>
+    <p:sldId id="586" r:id="rId8"/>
+    <p:sldId id="593" r:id="rId9"/>
+    <p:sldId id="610" r:id="rId10"/>
+    <p:sldId id="611" r:id="rId11"/>
+    <p:sldId id="592" r:id="rId12"/>
+    <p:sldId id="594" r:id="rId13"/>
+    <p:sldId id="612" r:id="rId14"/>
+    <p:sldId id="613" r:id="rId15"/>
+    <p:sldId id="562" r:id="rId16"/>
+    <p:sldId id="595" r:id="rId17"/>
+    <p:sldId id="596" r:id="rId18"/>
+    <p:sldId id="597" r:id="rId19"/>
+    <p:sldId id="598" r:id="rId20"/>
+    <p:sldId id="563" r:id="rId21"/>
+    <p:sldId id="605" r:id="rId22"/>
+    <p:sldId id="614" r:id="rId23"/>
+    <p:sldId id="603" r:id="rId24"/>
+    <p:sldId id="604" r:id="rId25"/>
+    <p:sldId id="607" r:id="rId26"/>
+    <p:sldId id="608" r:id="rId27"/>
+    <p:sldId id="601" r:id="rId28"/>
+    <p:sldId id="609" r:id="rId29"/>
+    <p:sldId id="569" r:id="rId30"/>
+    <p:sldId id="602" r:id="rId31"/>
+    <p:sldId id="573" r:id="rId32"/>
+    <p:sldId id="570" r:id="rId33"/>
+    <p:sldId id="571" r:id="rId34"/>
   </p:sldIdLst>
   <p:sldSz cx="12188825" cy="6858000"/>
   <p:notesSz cx="7010400" cy="9296400"/>
@@ -283,7 +284,7 @@
           <a:p>
             <a:fld id="{0B842F42-2CE9-4E35-95C1-410DC08A50B1}" type="datetimeFigureOut">
               <a:rPr lang="en-US" smtClean="0"/>
-              <a:t>7/29/20</a:t>
+              <a:t>7/31/20</a:t>
             </a:fld>
             <a:endParaRPr lang="en-US"/>
           </a:p>
@@ -448,7 +449,7 @@
           <a:p>
             <a:fld id="{6F282904-F315-4730-8D91-37D99E141A6F}" type="datetimeFigureOut">
               <a:rPr lang="en-US" smtClean="0"/>
-              <a:t>7/29/20</a:t>
+              <a:t>7/31/20</a:t>
             </a:fld>
             <a:endParaRPr lang="en-US"/>
           </a:p>
@@ -783,7 +784,7 @@
           <a:p>
             <a:fld id="{54E672D7-8E2D-4611-973D-F4591A707C34}" type="slidenum">
               <a:rPr lang="en-US" smtClean="0"/>
-              <a:t>20</a:t>
+              <a:t>21</a:t>
             </a:fld>
             <a:endParaRPr lang="en-US"/>
           </a:p>
@@ -889,7 +890,7 @@
           <a:p>
             <a:fld id="{6E363A66-168C-0143-BD3D-B116B7B003A5}" type="slidenum">
               <a:rPr lang="en-US" smtClean="0"/>
-              <a:t>23</a:t>
+              <a:t>24</a:t>
             </a:fld>
             <a:endParaRPr lang="en-US"/>
           </a:p>
@@ -973,7 +974,7 @@
           <a:p>
             <a:fld id="{6E363A66-168C-0143-BD3D-B116B7B003A5}" type="slidenum">
               <a:rPr lang="en-US" smtClean="0"/>
-              <a:t>26</a:t>
+              <a:t>27</a:t>
             </a:fld>
             <a:endParaRPr lang="en-US"/>
           </a:p>
@@ -1057,7 +1058,7 @@
           <a:p>
             <a:fld id="{6E363A66-168C-0143-BD3D-B116B7B003A5}" type="slidenum">
               <a:rPr lang="en-US" smtClean="0"/>
-              <a:t>27</a:t>
+              <a:t>28</a:t>
             </a:fld>
             <a:endParaRPr lang="en-US"/>
           </a:p>
@@ -1893,7 +1894,7 @@
           <a:noFill/>
           <a:extLst>
             <a:ext uri="{909E8E84-426E-40dd-AFC4-6F175D3DCCD1}">
-              <a14:hiddenFill xmlns="" xmlns:a14="http://schemas.microsoft.com/office/drawing/2010/main">
+              <a14:hiddenFill xmlns:a14="http://schemas.microsoft.com/office/drawing/2010/main" xmlns="">
                 <a:solidFill>
                   <a:srgbClr val="FFFFFF"/>
                 </a:solidFill>
@@ -2047,7 +2048,7 @@
           <a:noFill/>
           <a:extLst>
             <a:ext uri="{909E8E84-426E-40dd-AFC4-6F175D3DCCD1}">
-              <a14:hiddenFill xmlns="" xmlns:a14="http://schemas.microsoft.com/office/drawing/2010/main">
+              <a14:hiddenFill xmlns:a14="http://schemas.microsoft.com/office/drawing/2010/main" xmlns="">
                 <a:solidFill>
                   <a:srgbClr val="FFFFFF"/>
                 </a:solidFill>
@@ -6015,10 +6016,10 @@
       </p:sp>
       <p:sp>
         <p:nvSpPr>
-          <p:cNvPr id="18" name="Rounded Rectangle 17">
+          <p:cNvPr id="8" name="Rounded Rectangle 7">
             <a:extLst>
               <a:ext uri="{FF2B5EF4-FFF2-40B4-BE49-F238E27FC236}">
-                <a16:creationId xmlns:a16="http://schemas.microsoft.com/office/drawing/2014/main" id="{FD262230-1681-AF4E-B2F0-AFBCC7A193BF}"/>
+                <a16:creationId xmlns:a16="http://schemas.microsoft.com/office/drawing/2014/main" id="{3899DF7C-0BE0-0843-BC05-770FAC03F6BE}"/>
               </a:ext>
             </a:extLst>
           </p:cNvPr>
@@ -6082,79 +6083,10 @@
           </a:p>
         </p:txBody>
       </p:sp>
-      <p:sp>
-        <p:nvSpPr>
-          <p:cNvPr id="19" name="Rounded Rectangle 18">
-            <a:extLst>
-              <a:ext uri="{FF2B5EF4-FFF2-40B4-BE49-F238E27FC236}">
-                <a16:creationId xmlns:a16="http://schemas.microsoft.com/office/drawing/2014/main" id="{2862F1BC-F846-224E-B085-B39237C0FAC1}"/>
-              </a:ext>
-            </a:extLst>
-          </p:cNvPr>
-          <p:cNvSpPr/>
-          <p:nvPr/>
-        </p:nvSpPr>
-        <p:spPr>
-          <a:xfrm>
-            <a:off x="5420147" y="4023360"/>
-            <a:ext cx="3408917" cy="1699372"/>
-          </a:xfrm>
-          <a:prstGeom prst="roundRect">
-            <a:avLst/>
-          </a:prstGeom>
-          <a:solidFill>
-            <a:schemeClr val="tx2">
-              <a:lumMod val="20000"/>
-              <a:lumOff val="80000"/>
-            </a:schemeClr>
-          </a:solidFill>
-          <a:ln>
-            <a:noFill/>
-          </a:ln>
-          <a:effectLst>
-            <a:outerShdw blurRad="44450" dist="27940" dir="5400000" algn="ctr">
-              <a:srgbClr val="000000">
-                <a:alpha val="32000"/>
-              </a:srgbClr>
-            </a:outerShdw>
-          </a:effectLst>
-        </p:spPr>
-        <p:txBody>
-          <a:bodyPr rot="0" spcFirstLastPara="0" vertOverflow="overflow" horzOverflow="overflow" vert="horz" wrap="square" lIns="121851" tIns="60925" rIns="121851" bIns="60925" numCol="1" spcCol="0" rtlCol="0" fromWordArt="0" anchor="ctr" anchorCtr="0" forceAA="0" compatLnSpc="1">
-            <a:prstTxWarp prst="textNoShape">
-              <a:avLst/>
-            </a:prstTxWarp>
-            <a:noAutofit/>
-          </a:bodyPr>
-          <a:lstStyle/>
-          <a:p>
-            <a:pPr algn="ctr"/>
-            <a:r>
-              <a:rPr lang="en-US" sz="2000" dirty="0">
-                <a:solidFill>
-                  <a:schemeClr val="accent1"/>
-                </a:solidFill>
-              </a:rPr>
-              <a:t>Wrong incentives</a:t>
-            </a:r>
-          </a:p>
-          <a:p>
-            <a:pPr algn="ctr"/>
-            <a:r>
-              <a:rPr lang="en-US" sz="2000" dirty="0">
-                <a:solidFill>
-                  <a:schemeClr val="accent1"/>
-                </a:solidFill>
-              </a:rPr>
-              <a:t>Designing good tests is hard</a:t>
-            </a:r>
-          </a:p>
-        </p:txBody>
-      </p:sp>
     </p:spTree>
     <p:extLst>
       <p:ext uri="{BB962C8B-B14F-4D97-AF65-F5344CB8AC3E}">
-        <p14:creationId xmlns:p14="http://schemas.microsoft.com/office/powerpoint/2010/main" val="93140092"/>
+        <p14:creationId xmlns:p14="http://schemas.microsoft.com/office/powerpoint/2010/main" val="197705695"/>
       </p:ext>
     </p:extLst>
   </p:cSld>
@@ -6215,25 +6147,21 @@
         </p:nvSpPr>
         <p:spPr>
           <a:xfrm>
-            <a:off x="890815" y="1128937"/>
-            <a:ext cx="7697449" cy="637638"/>
+            <a:off x="943443" y="966203"/>
+            <a:ext cx="10693385" cy="359677"/>
           </a:xfrm>
         </p:spPr>
         <p:txBody>
           <a:bodyPr/>
           <a:lstStyle/>
           <a:p>
-            <a:pPr marL="0" indent="0" algn="ctr">
+            <a:pPr marL="0" indent="0">
               <a:buNone/>
             </a:pPr>
             <a:r>
-              <a:rPr lang="en-US" sz="2400" dirty="0"/>
-              <a:t>Taming the Complexity: Separation of Concerns</a:t>
-            </a:r>
-            <a:endParaRPr lang="en-US" dirty="0"/>
-          </a:p>
-          <a:p>
-            <a:endParaRPr lang="en-US" dirty="0"/>
+              <a:rPr lang="en-US" sz="2400" b="1" dirty="0"/>
+              <a:t>Desirable Characteristics and Why They are Challenging</a:t>
+            </a:r>
           </a:p>
           <a:p>
             <a:pPr lvl="1"/>
@@ -6243,10 +6171,90 @@
       </p:sp>
       <p:sp>
         <p:nvSpPr>
-          <p:cNvPr id="5" name="Rectangle 4">
+          <p:cNvPr id="5" name="TextBox 4">
             <a:extLst>
               <a:ext uri="{FF2B5EF4-FFF2-40B4-BE49-F238E27FC236}">
-                <a16:creationId xmlns:a16="http://schemas.microsoft.com/office/drawing/2014/main" id="{3BCD3279-1B86-B14E-B1AA-00B937F463A3}"/>
+                <a16:creationId xmlns:a16="http://schemas.microsoft.com/office/drawing/2014/main" id="{D8F3DAED-9D71-7A4D-ABCE-BAD854522A99}"/>
+              </a:ext>
+            </a:extLst>
+          </p:cNvPr>
+          <p:cNvSpPr txBox="1"/>
+          <p:nvPr/>
+        </p:nvSpPr>
+        <p:spPr>
+          <a:xfrm>
+            <a:off x="2198917" y="1446638"/>
+            <a:ext cx="1253164" cy="433965"/>
+          </a:xfrm>
+          <a:prstGeom prst="rect">
+            <a:avLst/>
+          </a:prstGeom>
+          <a:noFill/>
+        </p:spPr>
+        <p:txBody>
+          <a:bodyPr wrap="none" lIns="118872" tIns="91440" rIns="118872" bIns="91440" rtlCol="0" anchor="ctr" anchorCtr="0">
+            <a:spAutoFit/>
+          </a:bodyPr>
+          <a:lstStyle/>
+          <a:p>
+            <a:pPr algn="l">
+              <a:lnSpc>
+                <a:spcPct val="90000"/>
+              </a:lnSpc>
+            </a:pPr>
+            <a:r>
+              <a:rPr lang="en-US" dirty="0"/>
+              <a:t>Portability</a:t>
+            </a:r>
+          </a:p>
+        </p:txBody>
+      </p:sp>
+      <p:sp>
+        <p:nvSpPr>
+          <p:cNvPr id="15" name="TextBox 14">
+            <a:extLst>
+              <a:ext uri="{FF2B5EF4-FFF2-40B4-BE49-F238E27FC236}">
+                <a16:creationId xmlns:a16="http://schemas.microsoft.com/office/drawing/2014/main" id="{C78BF2DB-319B-F146-B7A1-BC81DCB8504A}"/>
+              </a:ext>
+            </a:extLst>
+          </p:cNvPr>
+          <p:cNvSpPr txBox="1"/>
+          <p:nvPr/>
+        </p:nvSpPr>
+        <p:spPr>
+          <a:xfrm>
+            <a:off x="5555459" y="1524659"/>
+            <a:ext cx="3317896" cy="433965"/>
+          </a:xfrm>
+          <a:prstGeom prst="rect">
+            <a:avLst/>
+          </a:prstGeom>
+          <a:noFill/>
+        </p:spPr>
+        <p:txBody>
+          <a:bodyPr wrap="none" lIns="118872" tIns="91440" rIns="118872" bIns="91440" rtlCol="0" anchor="ctr" anchorCtr="0">
+            <a:spAutoFit/>
+          </a:bodyPr>
+          <a:lstStyle/>
+          <a:p>
+            <a:pPr algn="l">
+              <a:lnSpc>
+                <a:spcPct val="90000"/>
+              </a:lnSpc>
+            </a:pPr>
+            <a:r>
+              <a:rPr lang="en-US" dirty="0"/>
+              <a:t>Verifiability and Maintainability</a:t>
+            </a:r>
+          </a:p>
+        </p:txBody>
+      </p:sp>
+      <p:sp>
+        <p:nvSpPr>
+          <p:cNvPr id="7" name="Rounded Rectangle 6">
+            <a:extLst>
+              <a:ext uri="{FF2B5EF4-FFF2-40B4-BE49-F238E27FC236}">
+                <a16:creationId xmlns:a16="http://schemas.microsoft.com/office/drawing/2014/main" id="{AB8C5454-7C3C-364A-9FC0-FAB9903FB673}"/>
               </a:ext>
             </a:extLst>
           </p:cNvPr>
@@ -6255,83 +6263,56 @@
         </p:nvSpPr>
         <p:spPr>
           <a:xfrm>
-            <a:off x="1340520" y="1850384"/>
-            <a:ext cx="1873771" cy="1528996"/>
-          </a:xfrm>
-          <a:prstGeom prst="rect">
+            <a:off x="1304596" y="2056199"/>
+            <a:ext cx="3408917" cy="1699372"/>
+          </a:xfrm>
+          <a:prstGeom prst="roundRect">
             <a:avLst/>
           </a:prstGeom>
           <a:solidFill>
-            <a:schemeClr val="accent1">
-              <a:lumMod val="40000"/>
-              <a:lumOff val="60000"/>
-            </a:schemeClr>
+            <a:schemeClr val="accent1"/>
           </a:solidFill>
-          <a:effectLst/>
+          <a:ln>
+            <a:noFill/>
+          </a:ln>
+          <a:effectLst>
+            <a:outerShdw blurRad="44450" dist="27940" dir="5400000" algn="ctr">
+              <a:srgbClr val="000000">
+                <a:alpha val="32000"/>
+              </a:srgbClr>
+            </a:outerShdw>
+          </a:effectLst>
         </p:spPr>
-        <p:style>
-          <a:lnRef idx="1">
-            <a:schemeClr val="accent1"/>
-          </a:lnRef>
-          <a:fillRef idx="3">
-            <a:schemeClr val="accent1"/>
-          </a:fillRef>
-          <a:effectRef idx="2">
-            <a:schemeClr val="accent1"/>
-          </a:effectRef>
-          <a:fontRef idx="minor">
-            <a:schemeClr val="lt1"/>
-          </a:fontRef>
-        </p:style>
         <p:txBody>
-          <a:bodyPr rtlCol="0" anchor="ctr"/>
+          <a:bodyPr rot="0" spcFirstLastPara="0" vertOverflow="overflow" horzOverflow="overflow" vert="horz" wrap="square" lIns="121851" tIns="60925" rIns="121851" bIns="60925" numCol="1" spcCol="0" rtlCol="0" fromWordArt="0" anchor="ctr" anchorCtr="0" forceAA="0" compatLnSpc="1">
+            <a:prstTxWarp prst="textNoShape">
+              <a:avLst/>
+            </a:prstTxWarp>
+            <a:noAutofit/>
+          </a:bodyPr>
           <a:lstStyle/>
           <a:p>
             <a:pPr algn="ctr"/>
             <a:r>
-              <a:rPr lang="en-US" b="1" dirty="0">
-                <a:solidFill>
-                  <a:schemeClr val="tx1"/>
+              <a:rPr lang="en-US" sz="2000" dirty="0">
+                <a:solidFill>
+                  <a:schemeClr val="tx2">
+                    <a:lumMod val="20000"/>
+                    <a:lumOff val="80000"/>
+                  </a:schemeClr>
                 </a:solidFill>
               </a:rPr>
-              <a:t>Subject of research</a:t>
-            </a:r>
-          </a:p>
-          <a:p>
-            <a:pPr algn="ctr"/>
-            <a:r>
-              <a:rPr lang="en-US" dirty="0">
-                <a:solidFill>
-                  <a:schemeClr val="tx1"/>
-                </a:solidFill>
-              </a:rPr>
-              <a:t>Model</a:t>
-            </a:r>
-          </a:p>
-          <a:p>
-            <a:pPr algn="ctr"/>
-            <a:r>
-              <a:rPr lang="en-US" dirty="0" err="1">
-                <a:solidFill>
-                  <a:schemeClr val="tx1"/>
-                </a:solidFill>
-              </a:rPr>
-              <a:t>Numerics</a:t>
-            </a:r>
-            <a:endParaRPr lang="en-US" dirty="0">
-              <a:solidFill>
-                <a:schemeClr val="tx1"/>
-              </a:solidFill>
-            </a:endParaRPr>
+              <a:t>General solutions that work without significant manual intervention across platforms</a:t>
+            </a:r>
           </a:p>
         </p:txBody>
       </p:sp>
       <p:sp>
         <p:nvSpPr>
-          <p:cNvPr id="6" name="Rectangle 5">
+          <p:cNvPr id="17" name="Rounded Rectangle 16">
             <a:extLst>
               <a:ext uri="{FF2B5EF4-FFF2-40B4-BE49-F238E27FC236}">
-                <a16:creationId xmlns:a16="http://schemas.microsoft.com/office/drawing/2014/main" id="{9AA1C2F6-DB31-644D-AA3E-8A5C5F208AF1}"/>
+                <a16:creationId xmlns:a16="http://schemas.microsoft.com/office/drawing/2014/main" id="{E92879B7-905C-BB44-A527-1A213FF082AB}"/>
               </a:ext>
             </a:extLst>
           </p:cNvPr>
@@ -6340,60 +6321,212 @@
         </p:nvSpPr>
         <p:spPr>
           <a:xfrm>
-            <a:off x="1340520" y="4546572"/>
-            <a:ext cx="1873771" cy="1528996"/>
-          </a:xfrm>
-          <a:prstGeom prst="rect">
+            <a:off x="5420146" y="2032815"/>
+            <a:ext cx="3408917" cy="1699372"/>
+          </a:xfrm>
+          <a:prstGeom prst="roundRect">
             <a:avLst/>
           </a:prstGeom>
           <a:solidFill>
-            <a:srgbClr val="0070C0"/>
+            <a:schemeClr val="accent1"/>
           </a:solidFill>
-          <a:effectLst/>
+          <a:ln>
+            <a:noFill/>
+          </a:ln>
+          <a:effectLst>
+            <a:outerShdw blurRad="44450" dist="27940" dir="5400000" algn="ctr">
+              <a:srgbClr val="000000">
+                <a:alpha val="32000"/>
+              </a:srgbClr>
+            </a:outerShdw>
+          </a:effectLst>
         </p:spPr>
-        <p:style>
-          <a:lnRef idx="1">
-            <a:schemeClr val="accent1"/>
-          </a:lnRef>
-          <a:fillRef idx="3">
-            <a:schemeClr val="accent1"/>
-          </a:fillRef>
-          <a:effectRef idx="2">
-            <a:schemeClr val="accent1"/>
-          </a:effectRef>
-          <a:fontRef idx="minor">
-            <a:schemeClr val="lt1"/>
-          </a:fontRef>
-        </p:style>
         <p:txBody>
-          <a:bodyPr rtlCol="0" anchor="ctr"/>
+          <a:bodyPr rot="0" spcFirstLastPara="0" vertOverflow="overflow" horzOverflow="overflow" vert="horz" wrap="square" lIns="121851" tIns="60925" rIns="121851" bIns="60925" numCol="1" spcCol="0" rtlCol="0" fromWordArt="0" anchor="ctr" anchorCtr="0" forceAA="0" compatLnSpc="1">
+            <a:prstTxWarp prst="textNoShape">
+              <a:avLst/>
+            </a:prstTxWarp>
+            <a:noAutofit/>
+          </a:bodyPr>
           <a:lstStyle/>
           <a:p>
             <a:pPr algn="ctr"/>
             <a:r>
-              <a:rPr lang="en-US" b="1" dirty="0"/>
-              <a:t>More Stable</a:t>
+              <a:rPr lang="en-US" sz="2000" dirty="0">
+                <a:solidFill>
+                  <a:schemeClr val="tx2">
+                    <a:lumMod val="20000"/>
+                    <a:lumOff val="80000"/>
+                  </a:schemeClr>
+                </a:solidFill>
+              </a:rPr>
+              <a:t>Clean code</a:t>
             </a:r>
           </a:p>
           <a:p>
             <a:pPr algn="ctr"/>
             <a:r>
-              <a:rPr lang="en-US" dirty="0"/>
-              <a:t>Discretization</a:t>
+              <a:rPr lang="en-US" sz="2000" dirty="0">
+                <a:solidFill>
+                  <a:schemeClr val="tx2">
+                    <a:lumMod val="20000"/>
+                    <a:lumOff val="80000"/>
+                  </a:schemeClr>
+                </a:solidFill>
+              </a:rPr>
+              <a:t>Documentation</a:t>
             </a:r>
           </a:p>
           <a:p>
             <a:pPr algn="ctr"/>
             <a:r>
-              <a:rPr lang="en-US" dirty="0"/>
-              <a:t>I/O</a:t>
-            </a:r>
-          </a:p>
+              <a:rPr lang="en-US" sz="2000" dirty="0">
+                <a:solidFill>
+                  <a:schemeClr val="tx2">
+                    <a:lumMod val="20000"/>
+                    <a:lumOff val="80000"/>
+                  </a:schemeClr>
+                </a:solidFill>
+              </a:rPr>
+              <a:t>Comprehensive testing</a:t>
+            </a:r>
+          </a:p>
+        </p:txBody>
+      </p:sp>
+      <p:sp>
+        <p:nvSpPr>
+          <p:cNvPr id="18" name="Rounded Rectangle 17">
+            <a:extLst>
+              <a:ext uri="{FF2B5EF4-FFF2-40B4-BE49-F238E27FC236}">
+                <a16:creationId xmlns:a16="http://schemas.microsoft.com/office/drawing/2014/main" id="{FD262230-1681-AF4E-B2F0-AFBCC7A193BF}"/>
+              </a:ext>
+            </a:extLst>
+          </p:cNvPr>
+          <p:cNvSpPr/>
+          <p:nvPr/>
+        </p:nvSpPr>
+        <p:spPr>
+          <a:xfrm>
+            <a:off x="1326032" y="4023360"/>
+            <a:ext cx="3408917" cy="1699372"/>
+          </a:xfrm>
+          <a:prstGeom prst="roundRect">
+            <a:avLst/>
+          </a:prstGeom>
+          <a:solidFill>
+            <a:schemeClr val="tx2">
+              <a:lumMod val="20000"/>
+              <a:lumOff val="80000"/>
+            </a:schemeClr>
+          </a:solidFill>
+          <a:ln>
+            <a:noFill/>
+          </a:ln>
+          <a:effectLst>
+            <a:outerShdw blurRad="44450" dist="27940" dir="5400000" algn="ctr">
+              <a:srgbClr val="000000">
+                <a:alpha val="32000"/>
+              </a:srgbClr>
+            </a:outerShdw>
+          </a:effectLst>
+        </p:spPr>
+        <p:txBody>
+          <a:bodyPr rot="0" spcFirstLastPara="0" vertOverflow="overflow" horzOverflow="overflow" vert="horz" wrap="square" lIns="121851" tIns="60925" rIns="121851" bIns="60925" numCol="1" spcCol="0" rtlCol="0" fromWordArt="0" anchor="ctr" anchorCtr="0" forceAA="0" compatLnSpc="1">
+            <a:prstTxWarp prst="textNoShape">
+              <a:avLst/>
+            </a:prstTxWarp>
+            <a:noAutofit/>
+          </a:bodyPr>
+          <a:lstStyle/>
           <a:p>
             <a:pPr algn="ctr"/>
             <a:r>
-              <a:rPr lang="en-US" dirty="0"/>
-              <a:t>Parameters </a:t>
+              <a:rPr lang="en-US" sz="2000" dirty="0">
+                <a:solidFill>
+                  <a:schemeClr val="accent1"/>
+                </a:solidFill>
+              </a:rPr>
+              <a:t>Tremendous platform heterogeneity</a:t>
+            </a:r>
+          </a:p>
+          <a:p>
+            <a:pPr algn="ctr"/>
+            <a:r>
+              <a:rPr lang="en-US" sz="2000" dirty="0">
+                <a:solidFill>
+                  <a:schemeClr val="accent1"/>
+                </a:solidFill>
+              </a:rPr>
+              <a:t>A version for each class of device =&gt; combinatorial explosion</a:t>
+            </a:r>
+          </a:p>
+        </p:txBody>
+      </p:sp>
+      <p:sp>
+        <p:nvSpPr>
+          <p:cNvPr id="19" name="Rounded Rectangle 18">
+            <a:extLst>
+              <a:ext uri="{FF2B5EF4-FFF2-40B4-BE49-F238E27FC236}">
+                <a16:creationId xmlns:a16="http://schemas.microsoft.com/office/drawing/2014/main" id="{2862F1BC-F846-224E-B085-B39237C0FAC1}"/>
+              </a:ext>
+            </a:extLst>
+          </p:cNvPr>
+          <p:cNvSpPr/>
+          <p:nvPr/>
+        </p:nvSpPr>
+        <p:spPr>
+          <a:xfrm>
+            <a:off x="5420147" y="4023360"/>
+            <a:ext cx="3408917" cy="1699372"/>
+          </a:xfrm>
+          <a:prstGeom prst="roundRect">
+            <a:avLst/>
+          </a:prstGeom>
+          <a:solidFill>
+            <a:schemeClr val="tx2">
+              <a:lumMod val="20000"/>
+              <a:lumOff val="80000"/>
+            </a:schemeClr>
+          </a:solidFill>
+          <a:ln>
+            <a:noFill/>
+          </a:ln>
+          <a:effectLst>
+            <a:outerShdw blurRad="44450" dist="27940" dir="5400000" algn="ctr">
+              <a:srgbClr val="000000">
+                <a:alpha val="32000"/>
+              </a:srgbClr>
+            </a:outerShdw>
+          </a:effectLst>
+        </p:spPr>
+        <p:txBody>
+          <a:bodyPr rot="0" spcFirstLastPara="0" vertOverflow="overflow" horzOverflow="overflow" vert="horz" wrap="square" lIns="121851" tIns="60925" rIns="121851" bIns="60925" numCol="1" spcCol="0" rtlCol="0" fromWordArt="0" anchor="ctr" anchorCtr="0" forceAA="0" compatLnSpc="1">
+            <a:prstTxWarp prst="textNoShape">
+              <a:avLst/>
+            </a:prstTxWarp>
+            <a:noAutofit/>
+          </a:bodyPr>
+          <a:lstStyle/>
+          <a:p>
+            <a:pPr algn="ctr"/>
+            <a:r>
+              <a:rPr lang="en-US" sz="2000" dirty="0">
+                <a:solidFill>
+                  <a:schemeClr val="accent1"/>
+                </a:solidFill>
+              </a:rPr>
+              <a:t>Wrong incentives</a:t>
+            </a:r>
+          </a:p>
+          <a:p>
+            <a:pPr algn="ctr"/>
+            <a:r>
+              <a:rPr lang="en-US" sz="2000" dirty="0">
+                <a:solidFill>
+                  <a:schemeClr val="accent1"/>
+                </a:solidFill>
+              </a:rPr>
+              <a:t>Designing good tests is hard</a:t>
             </a:r>
           </a:p>
         </p:txBody>
@@ -6401,7 +6534,7 @@
     </p:spTree>
     <p:extLst>
       <p:ext uri="{BB962C8B-B14F-4D97-AF65-F5344CB8AC3E}">
-        <p14:creationId xmlns:p14="http://schemas.microsoft.com/office/powerpoint/2010/main" val="1289229211"/>
+        <p14:creationId xmlns:p14="http://schemas.microsoft.com/office/powerpoint/2010/main" val="93140092"/>
       </p:ext>
     </p:extLst>
   </p:cSld>
@@ -6645,68 +6778,10 @@
           </a:p>
         </p:txBody>
       </p:sp>
-      <p:sp>
-        <p:nvSpPr>
-          <p:cNvPr id="8" name="Rectangle 7">
-            <a:extLst>
-              <a:ext uri="{FF2B5EF4-FFF2-40B4-BE49-F238E27FC236}">
-                <a16:creationId xmlns:a16="http://schemas.microsoft.com/office/drawing/2014/main" id="{7E4A8742-EAFC-7945-B8E7-7C02DC69617C}"/>
-              </a:ext>
-            </a:extLst>
-          </p:cNvPr>
-          <p:cNvSpPr/>
-          <p:nvPr/>
-        </p:nvSpPr>
-        <p:spPr>
-          <a:xfrm>
-            <a:off x="1340520" y="3544272"/>
-            <a:ext cx="1873771" cy="839449"/>
-          </a:xfrm>
-          <a:prstGeom prst="rect">
-            <a:avLst/>
-          </a:prstGeom>
-          <a:solidFill>
-            <a:schemeClr val="tx2">
-              <a:lumMod val="50000"/>
-            </a:schemeClr>
-          </a:solidFill>
-          <a:ln>
-            <a:solidFill>
-              <a:schemeClr val="tx1"/>
-            </a:solidFill>
-          </a:ln>
-          <a:effectLst/>
-        </p:spPr>
-        <p:style>
-          <a:lnRef idx="1">
-            <a:schemeClr val="accent1"/>
-          </a:lnRef>
-          <a:fillRef idx="3">
-            <a:schemeClr val="accent1"/>
-          </a:fillRef>
-          <a:effectRef idx="2">
-            <a:schemeClr val="accent1"/>
-          </a:effectRef>
-          <a:fontRef idx="minor">
-            <a:schemeClr val="lt1"/>
-          </a:fontRef>
-        </p:style>
-        <p:txBody>
-          <a:bodyPr rtlCol="0" anchor="ctr"/>
-          <a:lstStyle/>
-          <a:p>
-            <a:pPr algn="ctr"/>
-            <a:r>
-              <a:rPr lang="en-US" dirty="0"/>
-              <a:t>Treat differently</a:t>
-            </a:r>
-          </a:p>
-        </p:txBody>
-      </p:sp>
     </p:spTree>
     <p:extLst>
       <p:ext uri="{BB962C8B-B14F-4D97-AF65-F5344CB8AC3E}">
-        <p14:creationId xmlns:p14="http://schemas.microsoft.com/office/powerpoint/2010/main" val="334607759"/>
+        <p14:creationId xmlns:p14="http://schemas.microsoft.com/office/powerpoint/2010/main" val="1289229211"/>
       </p:ext>
     </p:extLst>
   </p:cSld>
@@ -7008,141 +7083,10 @@
           </a:p>
         </p:txBody>
       </p:sp>
-      <p:sp>
-        <p:nvSpPr>
-          <p:cNvPr id="9" name="Rectangle 8">
-            <a:extLst>
-              <a:ext uri="{FF2B5EF4-FFF2-40B4-BE49-F238E27FC236}">
-                <a16:creationId xmlns:a16="http://schemas.microsoft.com/office/drawing/2014/main" id="{1FF90A6A-80FD-1047-A93D-117341291BC1}"/>
-              </a:ext>
-            </a:extLst>
-          </p:cNvPr>
-          <p:cNvSpPr/>
-          <p:nvPr/>
-        </p:nvSpPr>
-        <p:spPr>
-          <a:xfrm>
-            <a:off x="3576552" y="1850384"/>
-            <a:ext cx="1873771" cy="1528996"/>
-          </a:xfrm>
-          <a:prstGeom prst="rect">
-            <a:avLst/>
-          </a:prstGeom>
-          <a:solidFill>
-            <a:schemeClr val="accent1">
-              <a:lumMod val="40000"/>
-              <a:lumOff val="60000"/>
-            </a:schemeClr>
-          </a:solidFill>
-          <a:effectLst/>
-        </p:spPr>
-        <p:style>
-          <a:lnRef idx="1">
-            <a:schemeClr val="accent1"/>
-          </a:lnRef>
-          <a:fillRef idx="3">
-            <a:schemeClr val="accent1"/>
-          </a:fillRef>
-          <a:effectRef idx="2">
-            <a:schemeClr val="accent1"/>
-          </a:effectRef>
-          <a:fontRef idx="minor">
-            <a:schemeClr val="lt1"/>
-          </a:fontRef>
-        </p:style>
-        <p:txBody>
-          <a:bodyPr rtlCol="0" anchor="ctr"/>
-          <a:lstStyle/>
-          <a:p>
-            <a:pPr algn="ctr"/>
-            <a:r>
-              <a:rPr lang="en-US" b="1" dirty="0">
-                <a:solidFill>
-                  <a:schemeClr val="tx1"/>
-                </a:solidFill>
-              </a:rPr>
-              <a:t>Client Code</a:t>
-            </a:r>
-          </a:p>
-          <a:p>
-            <a:pPr algn="ctr"/>
-            <a:r>
-              <a:rPr lang="en-US" dirty="0">
-                <a:solidFill>
-                  <a:schemeClr val="tx1"/>
-                </a:solidFill>
-              </a:rPr>
-              <a:t>Mathematically complex</a:t>
-            </a:r>
-          </a:p>
-        </p:txBody>
-      </p:sp>
-      <p:sp>
-        <p:nvSpPr>
-          <p:cNvPr id="11" name="Rectangle 10">
-            <a:extLst>
-              <a:ext uri="{FF2B5EF4-FFF2-40B4-BE49-F238E27FC236}">
-                <a16:creationId xmlns:a16="http://schemas.microsoft.com/office/drawing/2014/main" id="{0C99103D-F81B-364F-962C-0F9672801BBB}"/>
-              </a:ext>
-            </a:extLst>
-          </p:cNvPr>
-          <p:cNvSpPr/>
-          <p:nvPr/>
-        </p:nvSpPr>
-        <p:spPr>
-          <a:xfrm>
-            <a:off x="3576552" y="4546572"/>
-            <a:ext cx="1873771" cy="1528996"/>
-          </a:xfrm>
-          <a:prstGeom prst="rect">
-            <a:avLst/>
-          </a:prstGeom>
-          <a:solidFill>
-            <a:srgbClr val="0070C0"/>
-          </a:solidFill>
-          <a:effectLst/>
-        </p:spPr>
-        <p:style>
-          <a:lnRef idx="1">
-            <a:schemeClr val="accent1"/>
-          </a:lnRef>
-          <a:fillRef idx="3">
-            <a:schemeClr val="accent1"/>
-          </a:fillRef>
-          <a:effectRef idx="2">
-            <a:schemeClr val="accent1"/>
-          </a:effectRef>
-          <a:fontRef idx="minor">
-            <a:schemeClr val="lt1"/>
-          </a:fontRef>
-        </p:style>
-        <p:txBody>
-          <a:bodyPr rtlCol="0" anchor="ctr"/>
-          <a:lstStyle/>
-          <a:p>
-            <a:pPr algn="ctr"/>
-            <a:r>
-              <a:rPr lang="en-US" b="1" dirty="0"/>
-              <a:t>Infrastructure</a:t>
-            </a:r>
-          </a:p>
-          <a:p>
-            <a:pPr algn="ctr"/>
-            <a:r>
-              <a:rPr lang="en-US" dirty="0"/>
-              <a:t>Data structures and movement</a:t>
-            </a:r>
-          </a:p>
-          <a:p>
-            <a:pPr algn="ctr"/>
-            <a:endParaRPr lang="en-US" dirty="0"/>
-          </a:p>
-        </p:txBody>
-      </p:sp>
     </p:spTree>
     <p:extLst>
       <p:ext uri="{BB962C8B-B14F-4D97-AF65-F5344CB8AC3E}">
-        <p14:creationId xmlns:p14="http://schemas.microsoft.com/office/powerpoint/2010/main" val="3213464366"/>
+        <p14:creationId xmlns:p14="http://schemas.microsoft.com/office/powerpoint/2010/main" val="334607759"/>
       </p:ext>
     </p:extLst>
   </p:cSld>
@@ -7575,12 +7519,102 @@
           </a:p>
         </p:txBody>
       </p:sp>
+    </p:spTree>
+    <p:extLst>
+      <p:ext uri="{BB962C8B-B14F-4D97-AF65-F5344CB8AC3E}">
+        <p14:creationId xmlns:p14="http://schemas.microsoft.com/office/powerpoint/2010/main" val="3213464366"/>
+      </p:ext>
+    </p:extLst>
+  </p:cSld>
+  <p:clrMapOvr>
+    <a:masterClrMapping/>
+  </p:clrMapOvr>
+</p:sld>
+</file>
+
+<file path=ppt/slides/slide15.xml><?xml version="1.0" encoding="utf-8"?>
+<p:sld xmlns:a="http://schemas.openxmlformats.org/drawingml/2006/main" xmlns:r="http://schemas.openxmlformats.org/officeDocument/2006/relationships" xmlns:p="http://schemas.openxmlformats.org/presentationml/2006/main">
+  <p:cSld>
+    <p:spTree>
+      <p:nvGrpSpPr>
+        <p:cNvPr id="1" name=""/>
+        <p:cNvGrpSpPr/>
+        <p:nvPr/>
+      </p:nvGrpSpPr>
+      <p:grpSpPr>
+        <a:xfrm>
+          <a:off x="0" y="0"/>
+          <a:ext cx="0" cy="0"/>
+          <a:chOff x="0" y="0"/>
+          <a:chExt cx="0" cy="0"/>
+        </a:xfrm>
+      </p:grpSpPr>
       <p:sp>
         <p:nvSpPr>
-          <p:cNvPr id="12" name="Rectangle 11">
+          <p:cNvPr id="2" name="Title 1"/>
+          <p:cNvSpPr>
+            <a:spLocks noGrp="1"/>
+          </p:cNvSpPr>
+          <p:nvPr>
+            <p:ph type="title"/>
+          </p:nvPr>
+        </p:nvSpPr>
+        <p:spPr/>
+        <p:txBody>
+          <a:bodyPr/>
+          <a:lstStyle/>
+          <a:p>
+            <a:r>
+              <a:rPr lang="en-US" dirty="0"/>
+              <a:t>Architecting scientific codes</a:t>
+            </a:r>
+          </a:p>
+        </p:txBody>
+      </p:sp>
+      <p:sp>
+        <p:nvSpPr>
+          <p:cNvPr id="3" name="Content Placeholder 2"/>
+          <p:cNvSpPr>
+            <a:spLocks noGrp="1"/>
+          </p:cNvSpPr>
+          <p:nvPr>
+            <p:ph idx="1"/>
+          </p:nvPr>
+        </p:nvSpPr>
+        <p:spPr>
+          <a:xfrm>
+            <a:off x="890815" y="1128937"/>
+            <a:ext cx="7697449" cy="637638"/>
+          </a:xfrm>
+        </p:spPr>
+        <p:txBody>
+          <a:bodyPr/>
+          <a:lstStyle/>
+          <a:p>
+            <a:pPr marL="0" indent="0" algn="ctr">
+              <a:buNone/>
+            </a:pPr>
+            <a:r>
+              <a:rPr lang="en-US" sz="2400" dirty="0"/>
+              <a:t>Taming the Complexity: Separation of Concerns</a:t>
+            </a:r>
+            <a:endParaRPr lang="en-US" dirty="0"/>
+          </a:p>
+          <a:p>
+            <a:endParaRPr lang="en-US" dirty="0"/>
+          </a:p>
+          <a:p>
+            <a:pPr lvl="1"/>
+            <a:endParaRPr lang="en-US" dirty="0"/>
+          </a:p>
+        </p:txBody>
+      </p:sp>
+      <p:sp>
+        <p:nvSpPr>
+          <p:cNvPr id="5" name="Rectangle 4">
             <a:extLst>
               <a:ext uri="{FF2B5EF4-FFF2-40B4-BE49-F238E27FC236}">
-                <a16:creationId xmlns:a16="http://schemas.microsoft.com/office/drawing/2014/main" id="{FA035120-65AA-584A-9F3D-E4B12FF9D8BC}"/>
+                <a16:creationId xmlns:a16="http://schemas.microsoft.com/office/drawing/2014/main" id="{3BCD3279-1B86-B14E-B1AA-00B937F463A3}"/>
               </a:ext>
             </a:extLst>
           </p:cNvPr>
@@ -7589,7 +7623,164 @@
         </p:nvSpPr>
         <p:spPr>
           <a:xfrm>
-            <a:off x="3576552" y="3544272"/>
+            <a:off x="1340520" y="1850384"/>
+            <a:ext cx="1873771" cy="1528996"/>
+          </a:xfrm>
+          <a:prstGeom prst="rect">
+            <a:avLst/>
+          </a:prstGeom>
+          <a:solidFill>
+            <a:schemeClr val="accent1">
+              <a:lumMod val="40000"/>
+              <a:lumOff val="60000"/>
+            </a:schemeClr>
+          </a:solidFill>
+          <a:effectLst/>
+        </p:spPr>
+        <p:style>
+          <a:lnRef idx="1">
+            <a:schemeClr val="accent1"/>
+          </a:lnRef>
+          <a:fillRef idx="3">
+            <a:schemeClr val="accent1"/>
+          </a:fillRef>
+          <a:effectRef idx="2">
+            <a:schemeClr val="accent1"/>
+          </a:effectRef>
+          <a:fontRef idx="minor">
+            <a:schemeClr val="lt1"/>
+          </a:fontRef>
+        </p:style>
+        <p:txBody>
+          <a:bodyPr rtlCol="0" anchor="ctr"/>
+          <a:lstStyle/>
+          <a:p>
+            <a:pPr algn="ctr"/>
+            <a:r>
+              <a:rPr lang="en-US" b="1" dirty="0">
+                <a:solidFill>
+                  <a:schemeClr val="tx1"/>
+                </a:solidFill>
+              </a:rPr>
+              <a:t>Subject of research</a:t>
+            </a:r>
+          </a:p>
+          <a:p>
+            <a:pPr algn="ctr"/>
+            <a:r>
+              <a:rPr lang="en-US" dirty="0">
+                <a:solidFill>
+                  <a:schemeClr val="tx1"/>
+                </a:solidFill>
+              </a:rPr>
+              <a:t>Model</a:t>
+            </a:r>
+          </a:p>
+          <a:p>
+            <a:pPr algn="ctr"/>
+            <a:r>
+              <a:rPr lang="en-US" dirty="0" err="1">
+                <a:solidFill>
+                  <a:schemeClr val="tx1"/>
+                </a:solidFill>
+              </a:rPr>
+              <a:t>Numerics</a:t>
+            </a:r>
+            <a:endParaRPr lang="en-US" dirty="0">
+              <a:solidFill>
+                <a:schemeClr val="tx1"/>
+              </a:solidFill>
+            </a:endParaRPr>
+          </a:p>
+        </p:txBody>
+      </p:sp>
+      <p:sp>
+        <p:nvSpPr>
+          <p:cNvPr id="6" name="Rectangle 5">
+            <a:extLst>
+              <a:ext uri="{FF2B5EF4-FFF2-40B4-BE49-F238E27FC236}">
+                <a16:creationId xmlns:a16="http://schemas.microsoft.com/office/drawing/2014/main" id="{9AA1C2F6-DB31-644D-AA3E-8A5C5F208AF1}"/>
+              </a:ext>
+            </a:extLst>
+          </p:cNvPr>
+          <p:cNvSpPr/>
+          <p:nvPr/>
+        </p:nvSpPr>
+        <p:spPr>
+          <a:xfrm>
+            <a:off x="1340520" y="4546572"/>
+            <a:ext cx="1873771" cy="1528996"/>
+          </a:xfrm>
+          <a:prstGeom prst="rect">
+            <a:avLst/>
+          </a:prstGeom>
+          <a:solidFill>
+            <a:srgbClr val="0070C0"/>
+          </a:solidFill>
+          <a:effectLst/>
+        </p:spPr>
+        <p:style>
+          <a:lnRef idx="1">
+            <a:schemeClr val="accent1"/>
+          </a:lnRef>
+          <a:fillRef idx="3">
+            <a:schemeClr val="accent1"/>
+          </a:fillRef>
+          <a:effectRef idx="2">
+            <a:schemeClr val="accent1"/>
+          </a:effectRef>
+          <a:fontRef idx="minor">
+            <a:schemeClr val="lt1"/>
+          </a:fontRef>
+        </p:style>
+        <p:txBody>
+          <a:bodyPr rtlCol="0" anchor="ctr"/>
+          <a:lstStyle/>
+          <a:p>
+            <a:pPr algn="ctr"/>
+            <a:r>
+              <a:rPr lang="en-US" b="1" dirty="0"/>
+              <a:t>More Stable</a:t>
+            </a:r>
+          </a:p>
+          <a:p>
+            <a:pPr algn="ctr"/>
+            <a:r>
+              <a:rPr lang="en-US" dirty="0"/>
+              <a:t>Discretization</a:t>
+            </a:r>
+          </a:p>
+          <a:p>
+            <a:pPr algn="ctr"/>
+            <a:r>
+              <a:rPr lang="en-US" dirty="0"/>
+              <a:t>I/O</a:t>
+            </a:r>
+          </a:p>
+          <a:p>
+            <a:pPr algn="ctr"/>
+            <a:r>
+              <a:rPr lang="en-US" dirty="0"/>
+              <a:t>Parameters </a:t>
+            </a:r>
+          </a:p>
+        </p:txBody>
+      </p:sp>
+      <p:sp>
+        <p:nvSpPr>
+          <p:cNvPr id="8" name="Rectangle 7">
+            <a:extLst>
+              <a:ext uri="{FF2B5EF4-FFF2-40B4-BE49-F238E27FC236}">
+                <a16:creationId xmlns:a16="http://schemas.microsoft.com/office/drawing/2014/main" id="{7E4A8742-EAFC-7945-B8E7-7C02DC69617C}"/>
+              </a:ext>
+            </a:extLst>
+          </p:cNvPr>
+          <p:cNvSpPr/>
+          <p:nvPr/>
+        </p:nvSpPr>
+        <p:spPr>
+          <a:xfrm>
+            <a:off x="1340520" y="3544272"/>
             <a:ext cx="1873771" cy="839449"/>
           </a:xfrm>
           <a:prstGeom prst="rect">
@@ -7628,6 +7819,195 @@
             <a:pPr algn="ctr"/>
             <a:r>
               <a:rPr lang="en-US" dirty="0"/>
+              <a:t>Treat differently</a:t>
+            </a:r>
+          </a:p>
+        </p:txBody>
+      </p:sp>
+      <p:sp>
+        <p:nvSpPr>
+          <p:cNvPr id="9" name="Rectangle 8">
+            <a:extLst>
+              <a:ext uri="{FF2B5EF4-FFF2-40B4-BE49-F238E27FC236}">
+                <a16:creationId xmlns:a16="http://schemas.microsoft.com/office/drawing/2014/main" id="{1FF90A6A-80FD-1047-A93D-117341291BC1}"/>
+              </a:ext>
+            </a:extLst>
+          </p:cNvPr>
+          <p:cNvSpPr/>
+          <p:nvPr/>
+        </p:nvSpPr>
+        <p:spPr>
+          <a:xfrm>
+            <a:off x="3576552" y="1850384"/>
+            <a:ext cx="1873771" cy="1528996"/>
+          </a:xfrm>
+          <a:prstGeom prst="rect">
+            <a:avLst/>
+          </a:prstGeom>
+          <a:solidFill>
+            <a:schemeClr val="accent1">
+              <a:lumMod val="40000"/>
+              <a:lumOff val="60000"/>
+            </a:schemeClr>
+          </a:solidFill>
+          <a:effectLst/>
+        </p:spPr>
+        <p:style>
+          <a:lnRef idx="1">
+            <a:schemeClr val="accent1"/>
+          </a:lnRef>
+          <a:fillRef idx="3">
+            <a:schemeClr val="accent1"/>
+          </a:fillRef>
+          <a:effectRef idx="2">
+            <a:schemeClr val="accent1"/>
+          </a:effectRef>
+          <a:fontRef idx="minor">
+            <a:schemeClr val="lt1"/>
+          </a:fontRef>
+        </p:style>
+        <p:txBody>
+          <a:bodyPr rtlCol="0" anchor="ctr"/>
+          <a:lstStyle/>
+          <a:p>
+            <a:pPr algn="ctr"/>
+            <a:r>
+              <a:rPr lang="en-US" b="1" dirty="0">
+                <a:solidFill>
+                  <a:schemeClr val="tx1"/>
+                </a:solidFill>
+              </a:rPr>
+              <a:t>Client Code</a:t>
+            </a:r>
+          </a:p>
+          <a:p>
+            <a:pPr algn="ctr"/>
+            <a:r>
+              <a:rPr lang="en-US" dirty="0">
+                <a:solidFill>
+                  <a:schemeClr val="tx1"/>
+                </a:solidFill>
+              </a:rPr>
+              <a:t>Mathematically complex</a:t>
+            </a:r>
+          </a:p>
+        </p:txBody>
+      </p:sp>
+      <p:sp>
+        <p:nvSpPr>
+          <p:cNvPr id="11" name="Rectangle 10">
+            <a:extLst>
+              <a:ext uri="{FF2B5EF4-FFF2-40B4-BE49-F238E27FC236}">
+                <a16:creationId xmlns:a16="http://schemas.microsoft.com/office/drawing/2014/main" id="{0C99103D-F81B-364F-962C-0F9672801BBB}"/>
+              </a:ext>
+            </a:extLst>
+          </p:cNvPr>
+          <p:cNvSpPr/>
+          <p:nvPr/>
+        </p:nvSpPr>
+        <p:spPr>
+          <a:xfrm>
+            <a:off x="3576552" y="4546572"/>
+            <a:ext cx="1873771" cy="1528996"/>
+          </a:xfrm>
+          <a:prstGeom prst="rect">
+            <a:avLst/>
+          </a:prstGeom>
+          <a:solidFill>
+            <a:srgbClr val="0070C0"/>
+          </a:solidFill>
+          <a:effectLst/>
+        </p:spPr>
+        <p:style>
+          <a:lnRef idx="1">
+            <a:schemeClr val="accent1"/>
+          </a:lnRef>
+          <a:fillRef idx="3">
+            <a:schemeClr val="accent1"/>
+          </a:fillRef>
+          <a:effectRef idx="2">
+            <a:schemeClr val="accent1"/>
+          </a:effectRef>
+          <a:fontRef idx="minor">
+            <a:schemeClr val="lt1"/>
+          </a:fontRef>
+        </p:style>
+        <p:txBody>
+          <a:bodyPr rtlCol="0" anchor="ctr"/>
+          <a:lstStyle/>
+          <a:p>
+            <a:pPr algn="ctr"/>
+            <a:r>
+              <a:rPr lang="en-US" b="1" dirty="0"/>
+              <a:t>Infrastructure</a:t>
+            </a:r>
+          </a:p>
+          <a:p>
+            <a:pPr algn="ctr"/>
+            <a:r>
+              <a:rPr lang="en-US" dirty="0"/>
+              <a:t>Data structures and movement</a:t>
+            </a:r>
+          </a:p>
+          <a:p>
+            <a:pPr algn="ctr"/>
+            <a:endParaRPr lang="en-US" dirty="0"/>
+          </a:p>
+        </p:txBody>
+      </p:sp>
+      <p:sp>
+        <p:nvSpPr>
+          <p:cNvPr id="12" name="Rectangle 11">
+            <a:extLst>
+              <a:ext uri="{FF2B5EF4-FFF2-40B4-BE49-F238E27FC236}">
+                <a16:creationId xmlns:a16="http://schemas.microsoft.com/office/drawing/2014/main" id="{FA035120-65AA-584A-9F3D-E4B12FF9D8BC}"/>
+              </a:ext>
+            </a:extLst>
+          </p:cNvPr>
+          <p:cNvSpPr/>
+          <p:nvPr/>
+        </p:nvSpPr>
+        <p:spPr>
+          <a:xfrm>
+            <a:off x="3576552" y="3544272"/>
+            <a:ext cx="1873771" cy="839449"/>
+          </a:xfrm>
+          <a:prstGeom prst="rect">
+            <a:avLst/>
+          </a:prstGeom>
+          <a:solidFill>
+            <a:schemeClr val="tx2">
+              <a:lumMod val="50000"/>
+            </a:schemeClr>
+          </a:solidFill>
+          <a:ln>
+            <a:solidFill>
+              <a:schemeClr val="tx1"/>
+            </a:solidFill>
+          </a:ln>
+          <a:effectLst/>
+        </p:spPr>
+        <p:style>
+          <a:lnRef idx="1">
+            <a:schemeClr val="accent1"/>
+          </a:lnRef>
+          <a:fillRef idx="3">
+            <a:schemeClr val="accent1"/>
+          </a:fillRef>
+          <a:effectRef idx="2">
+            <a:schemeClr val="accent1"/>
+          </a:effectRef>
+          <a:fontRef idx="minor">
+            <a:schemeClr val="lt1"/>
+          </a:fontRef>
+        </p:style>
+        <p:txBody>
+          <a:bodyPr rtlCol="0" anchor="ctr"/>
+          <a:lstStyle/>
+          <a:p>
+            <a:pPr algn="ctr"/>
+            <a:r>
+              <a:rPr lang="en-US" dirty="0"/>
               <a:t>Hide from one another</a:t>
             </a:r>
           </a:p>
@@ -7646,7 +8026,7 @@
 </p:sld>
 </file>
 
-<file path=ppt/slides/slide15.xml><?xml version="1.0" encoding="utf-8"?>
+<file path=ppt/slides/slide16.xml><?xml version="1.0" encoding="utf-8"?>
 <p:sld xmlns:a="http://schemas.openxmlformats.org/drawingml/2006/main" xmlns:r="http://schemas.openxmlformats.org/officeDocument/2006/relationships" xmlns:p="http://schemas.openxmlformats.org/presentationml/2006/main">
   <p:cSld>
     <p:spTree>
@@ -8699,7 +9079,7 @@
 </p:sld>
 </file>
 
-<file path=ppt/slides/slide16.xml><?xml version="1.0" encoding="utf-8"?>
+<file path=ppt/slides/slide17.xml><?xml version="1.0" encoding="utf-8"?>
 <p:sld xmlns:a="http://schemas.openxmlformats.org/drawingml/2006/main" xmlns:r="http://schemas.openxmlformats.org/officeDocument/2006/relationships" xmlns:p="http://schemas.openxmlformats.org/presentationml/2006/main">
   <p:cSld>
     <p:spTree>
@@ -9876,465 +10256,6 @@
 </p:sld>
 </file>
 
-<file path=ppt/slides/slide17.xml><?xml version="1.0" encoding="utf-8"?>
-<p:sld xmlns:a="http://schemas.openxmlformats.org/drawingml/2006/main" xmlns:r="http://schemas.openxmlformats.org/officeDocument/2006/relationships" xmlns:p="http://schemas.openxmlformats.org/presentationml/2006/main">
-  <p:cSld>
-    <p:spTree>
-      <p:nvGrpSpPr>
-        <p:cNvPr id="1" name=""/>
-        <p:cNvGrpSpPr/>
-        <p:nvPr/>
-      </p:nvGrpSpPr>
-      <p:grpSpPr>
-        <a:xfrm>
-          <a:off x="0" y="0"/>
-          <a:ext cx="0" cy="0"/>
-          <a:chOff x="0" y="0"/>
-          <a:chExt cx="0" cy="0"/>
-        </a:xfrm>
-      </p:grpSpPr>
-      <p:sp>
-        <p:nvSpPr>
-          <p:cNvPr id="10" name="Rectangle 9">
-            <a:extLst>
-              <a:ext uri="{FF2B5EF4-FFF2-40B4-BE49-F238E27FC236}">
-                <a16:creationId xmlns:a16="http://schemas.microsoft.com/office/drawing/2014/main" id="{3E7EC149-0D6E-EA43-BEFD-0D592A41CAD3}"/>
-              </a:ext>
-            </a:extLst>
-          </p:cNvPr>
-          <p:cNvSpPr/>
-          <p:nvPr/>
-        </p:nvSpPr>
-        <p:spPr>
-          <a:xfrm>
-            <a:off x="166255" y="1550177"/>
-            <a:ext cx="5403273" cy="4241023"/>
-          </a:xfrm>
-          <a:prstGeom prst="rect">
-            <a:avLst/>
-          </a:prstGeom>
-          <a:solidFill>
-            <a:schemeClr val="accent3"/>
-          </a:solidFill>
-          <a:ln>
-            <a:noFill/>
-          </a:ln>
-          <a:effectLst>
-            <a:outerShdw blurRad="44450" dist="27940" dir="5400000" algn="ctr">
-              <a:srgbClr val="000000">
-                <a:alpha val="32000"/>
-              </a:srgbClr>
-            </a:outerShdw>
-          </a:effectLst>
-        </p:spPr>
-        <p:txBody>
-          <a:bodyPr rot="0" spcFirstLastPara="0" vertOverflow="overflow" horzOverflow="overflow" vert="horz" wrap="square" lIns="121851" tIns="60925" rIns="121851" bIns="60925" numCol="1" spcCol="0" rtlCol="0" fromWordArt="0" anchor="ctr" anchorCtr="0" forceAA="0" compatLnSpc="1">
-            <a:prstTxWarp prst="textNoShape">
-              <a:avLst/>
-            </a:prstTxWarp>
-            <a:noAutofit/>
-          </a:bodyPr>
-          <a:lstStyle/>
-          <a:p>
-            <a:pPr algn="ctr">
-              <a:lnSpc>
-                <a:spcPct val="90000"/>
-              </a:lnSpc>
-            </a:pPr>
-            <a:endParaRPr lang="en-US" sz="2000" dirty="0">
-              <a:solidFill>
-                <a:schemeClr val="bg1"/>
-              </a:solidFill>
-            </a:endParaRPr>
-          </a:p>
-        </p:txBody>
-      </p:sp>
-      <p:sp>
-        <p:nvSpPr>
-          <p:cNvPr id="3" name="Content Placeholder 2">
-            <a:extLst>
-              <a:ext uri="{FF2B5EF4-FFF2-40B4-BE49-F238E27FC236}">
-                <a16:creationId xmlns:a16="http://schemas.microsoft.com/office/drawing/2014/main" id="{36D087C7-F6DB-6246-BA7E-84DE6BC80227}"/>
-              </a:ext>
-            </a:extLst>
-          </p:cNvPr>
-          <p:cNvSpPr>
-            <a:spLocks noGrp="1"/>
-          </p:cNvSpPr>
-          <p:nvPr>
-            <p:ph idx="1"/>
-          </p:nvPr>
-        </p:nvSpPr>
-        <p:spPr>
-          <a:xfrm>
-            <a:off x="282633" y="1688722"/>
-            <a:ext cx="5286895" cy="4102478"/>
-          </a:xfrm>
-        </p:spPr>
-        <p:txBody>
-          <a:bodyPr/>
-          <a:lstStyle/>
-          <a:p>
-            <a:r>
-              <a:rPr lang="en-US" dirty="0"/>
-              <a:t>Infrastructure design</a:t>
-            </a:r>
-          </a:p>
-          <a:p>
-            <a:pPr lvl="1"/>
-            <a:r>
-              <a:rPr lang="en-US" dirty="0"/>
-              <a:t>Take time to discuss, iterate over requirements and specification</a:t>
-            </a:r>
-          </a:p>
-          <a:p>
-            <a:pPr lvl="1"/>
-            <a:r>
-              <a:rPr lang="en-US" dirty="0"/>
-              <a:t>Keep end users involved </a:t>
-            </a:r>
-          </a:p>
-          <a:p>
-            <a:pPr lvl="2"/>
-            <a:r>
-              <a:rPr lang="en-US" dirty="0"/>
-              <a:t>Not doing so leaves possible options on the table</a:t>
-            </a:r>
-          </a:p>
-          <a:p>
-            <a:r>
-              <a:rPr lang="en-US" dirty="0"/>
-              <a:t>Simple is better</a:t>
-            </a:r>
-          </a:p>
-          <a:p>
-            <a:pPr lvl="1"/>
-            <a:r>
-              <a:rPr lang="en-US" dirty="0"/>
-              <a:t>Flexibility Vs transparent to the user</a:t>
-            </a:r>
-          </a:p>
-          <a:p>
-            <a:pPr lvl="2"/>
-            <a:r>
-              <a:rPr lang="en-US" dirty="0"/>
-              <a:t>Flexibility wins</a:t>
-            </a:r>
-          </a:p>
-        </p:txBody>
-      </p:sp>
-      <p:sp>
-        <p:nvSpPr>
-          <p:cNvPr id="4" name="Date Placeholder 3">
-            <a:extLst>
-              <a:ext uri="{FF2B5EF4-FFF2-40B4-BE49-F238E27FC236}">
-                <a16:creationId xmlns:a16="http://schemas.microsoft.com/office/drawing/2014/main" id="{B2C88E49-3CEB-584A-AFB2-5B51EA707452}"/>
-              </a:ext>
-            </a:extLst>
-          </p:cNvPr>
-          <p:cNvSpPr>
-            <a:spLocks noGrp="1"/>
-          </p:cNvSpPr>
-          <p:nvPr>
-            <p:ph type="dt" sz="half" idx="10"/>
-          </p:nvPr>
-        </p:nvSpPr>
-        <p:spPr>
-          <a:xfrm>
-            <a:off x="6858000" y="6356350"/>
-            <a:ext cx="1600200" cy="274320"/>
-          </a:xfrm>
-          <a:prstGeom prst="rect">
-            <a:avLst/>
-          </a:prstGeom>
-        </p:spPr>
-        <p:txBody>
-          <a:bodyPr vert="horz" lIns="91440" tIns="45720" rIns="91440" bIns="45720" rtlCol="0" anchor="ctr" anchorCtr="0"/>
-          <a:lstStyle>
-            <a:defPPr>
-              <a:defRPr lang="en-US"/>
-            </a:defPPr>
-            <a:lvl1pPr marL="0" algn="r" defTabSz="914400" rtl="0" eaLnBrk="1" latinLnBrk="0" hangingPunct="1">
-              <a:defRPr sz="1100" kern="1200">
-                <a:solidFill>
-                  <a:schemeClr val="tx1"/>
-                </a:solidFill>
-                <a:latin typeface="Arial" panose="020B0604020202020204" pitchFamily="34" charset="0"/>
-                <a:ea typeface="+mn-ea"/>
-                <a:cs typeface="Arial" panose="020B0604020202020204" pitchFamily="34" charset="0"/>
-              </a:defRPr>
-            </a:lvl1pPr>
-            <a:lvl2pPr marL="457200" algn="l" defTabSz="914400" rtl="0" eaLnBrk="1" latinLnBrk="0" hangingPunct="1">
-              <a:defRPr sz="1800" kern="1200">
-                <a:solidFill>
-                  <a:schemeClr val="tx1"/>
-                </a:solidFill>
-                <a:latin typeface="+mn-lt"/>
-                <a:ea typeface="+mn-ea"/>
-                <a:cs typeface="+mn-cs"/>
-              </a:defRPr>
-            </a:lvl2pPr>
-            <a:lvl3pPr marL="914400" algn="l" defTabSz="914400" rtl="0" eaLnBrk="1" latinLnBrk="0" hangingPunct="1">
-              <a:defRPr sz="1800" kern="1200">
-                <a:solidFill>
-                  <a:schemeClr val="tx1"/>
-                </a:solidFill>
-                <a:latin typeface="+mn-lt"/>
-                <a:ea typeface="+mn-ea"/>
-                <a:cs typeface="+mn-cs"/>
-              </a:defRPr>
-            </a:lvl3pPr>
-            <a:lvl4pPr marL="1371600" algn="l" defTabSz="914400" rtl="0" eaLnBrk="1" latinLnBrk="0" hangingPunct="1">
-              <a:defRPr sz="1800" kern="1200">
-                <a:solidFill>
-                  <a:schemeClr val="tx1"/>
-                </a:solidFill>
-                <a:latin typeface="+mn-lt"/>
-                <a:ea typeface="+mn-ea"/>
-                <a:cs typeface="+mn-cs"/>
-              </a:defRPr>
-            </a:lvl4pPr>
-            <a:lvl5pPr marL="1828800" algn="l" defTabSz="914400" rtl="0" eaLnBrk="1" latinLnBrk="0" hangingPunct="1">
-              <a:defRPr sz="1800" kern="1200">
-                <a:solidFill>
-                  <a:schemeClr val="tx1"/>
-                </a:solidFill>
-                <a:latin typeface="+mn-lt"/>
-                <a:ea typeface="+mn-ea"/>
-                <a:cs typeface="+mn-cs"/>
-              </a:defRPr>
-            </a:lvl5pPr>
-            <a:lvl6pPr marL="2286000" algn="l" defTabSz="914400" rtl="0" eaLnBrk="1" latinLnBrk="0" hangingPunct="1">
-              <a:defRPr sz="1800" kern="1200">
-                <a:solidFill>
-                  <a:schemeClr val="tx1"/>
-                </a:solidFill>
-                <a:latin typeface="+mn-lt"/>
-                <a:ea typeface="+mn-ea"/>
-                <a:cs typeface="+mn-cs"/>
-              </a:defRPr>
-            </a:lvl6pPr>
-            <a:lvl7pPr marL="2743200" algn="l" defTabSz="914400" rtl="0" eaLnBrk="1" latinLnBrk="0" hangingPunct="1">
-              <a:defRPr sz="1800" kern="1200">
-                <a:solidFill>
-                  <a:schemeClr val="tx1"/>
-                </a:solidFill>
-                <a:latin typeface="+mn-lt"/>
-                <a:ea typeface="+mn-ea"/>
-                <a:cs typeface="+mn-cs"/>
-              </a:defRPr>
-            </a:lvl7pPr>
-            <a:lvl8pPr marL="3200400" algn="l" defTabSz="914400" rtl="0" eaLnBrk="1" latinLnBrk="0" hangingPunct="1">
-              <a:defRPr sz="1800" kern="1200">
-                <a:solidFill>
-                  <a:schemeClr val="tx1"/>
-                </a:solidFill>
-                <a:latin typeface="+mn-lt"/>
-                <a:ea typeface="+mn-ea"/>
-                <a:cs typeface="+mn-cs"/>
-              </a:defRPr>
-            </a:lvl8pPr>
-            <a:lvl9pPr marL="3657600" algn="l" defTabSz="914400" rtl="0" eaLnBrk="1" latinLnBrk="0" hangingPunct="1">
-              <a:defRPr sz="1800" kern="1200">
-                <a:solidFill>
-                  <a:schemeClr val="tx1"/>
-                </a:solidFill>
-                <a:latin typeface="+mn-lt"/>
-                <a:ea typeface="+mn-ea"/>
-                <a:cs typeface="+mn-cs"/>
-              </a:defRPr>
-            </a:lvl9pPr>
-          </a:lstStyle>
-          <a:p>
-            <a:fld id="{B557289E-1B3F-4E63-935A-0E0E5EBBCF05}" type="datetime1">
-              <a:rPr lang="en-US" smtClean="0"/>
-              <a:pPr/>
-              <a:t>7/29/20</a:t>
-            </a:fld>
-            <a:endParaRPr lang="en-US"/>
-          </a:p>
-        </p:txBody>
-      </p:sp>
-      <p:sp>
-        <p:nvSpPr>
-          <p:cNvPr id="5" name="Slide Number Placeholder 4">
-            <a:extLst>
-              <a:ext uri="{FF2B5EF4-FFF2-40B4-BE49-F238E27FC236}">
-                <a16:creationId xmlns:a16="http://schemas.microsoft.com/office/drawing/2014/main" id="{B05AEFD1-E907-E749-8CE9-8AC2C9DDB011}"/>
-              </a:ext>
-            </a:extLst>
-          </p:cNvPr>
-          <p:cNvSpPr>
-            <a:spLocks noGrp="1"/>
-          </p:cNvSpPr>
-          <p:nvPr>
-            <p:ph type="sldNum" sz="quarter" idx="12"/>
-          </p:nvPr>
-        </p:nvSpPr>
-        <p:spPr>
-          <a:xfrm>
-            <a:off x="8458200" y="6356350"/>
-            <a:ext cx="457200" cy="274320"/>
-          </a:xfrm>
-          <a:prstGeom prst="rect">
-            <a:avLst/>
-          </a:prstGeom>
-        </p:spPr>
-        <p:txBody>
-          <a:bodyPr vert="horz" lIns="91440" tIns="45720" rIns="91440" bIns="45720" rtlCol="0" anchor="ctr" anchorCtr="0"/>
-          <a:lstStyle>
-            <a:defPPr>
-              <a:defRPr lang="en-US"/>
-            </a:defPPr>
-            <a:lvl1pPr marL="0" algn="r" defTabSz="914400" rtl="0" eaLnBrk="1" latinLnBrk="0" hangingPunct="1">
-              <a:defRPr sz="1100" kern="1200">
-                <a:solidFill>
-                  <a:schemeClr val="tx1"/>
-                </a:solidFill>
-                <a:latin typeface="Arial" panose="020B0604020202020204" pitchFamily="34" charset="0"/>
-                <a:ea typeface="+mn-ea"/>
-                <a:cs typeface="Arial" panose="020B0604020202020204" pitchFamily="34" charset="0"/>
-              </a:defRPr>
-            </a:lvl1pPr>
-            <a:lvl2pPr marL="457200" algn="l" defTabSz="914400" rtl="0" eaLnBrk="1" latinLnBrk="0" hangingPunct="1">
-              <a:defRPr sz="1800" kern="1200">
-                <a:solidFill>
-                  <a:schemeClr val="tx1"/>
-                </a:solidFill>
-                <a:latin typeface="+mn-lt"/>
-                <a:ea typeface="+mn-ea"/>
-                <a:cs typeface="+mn-cs"/>
-              </a:defRPr>
-            </a:lvl2pPr>
-            <a:lvl3pPr marL="914400" algn="l" defTabSz="914400" rtl="0" eaLnBrk="1" latinLnBrk="0" hangingPunct="1">
-              <a:defRPr sz="1800" kern="1200">
-                <a:solidFill>
-                  <a:schemeClr val="tx1"/>
-                </a:solidFill>
-                <a:latin typeface="+mn-lt"/>
-                <a:ea typeface="+mn-ea"/>
-                <a:cs typeface="+mn-cs"/>
-              </a:defRPr>
-            </a:lvl3pPr>
-            <a:lvl4pPr marL="1371600" algn="l" defTabSz="914400" rtl="0" eaLnBrk="1" latinLnBrk="0" hangingPunct="1">
-              <a:defRPr sz="1800" kern="1200">
-                <a:solidFill>
-                  <a:schemeClr val="tx1"/>
-                </a:solidFill>
-                <a:latin typeface="+mn-lt"/>
-                <a:ea typeface="+mn-ea"/>
-                <a:cs typeface="+mn-cs"/>
-              </a:defRPr>
-            </a:lvl4pPr>
-            <a:lvl5pPr marL="1828800" algn="l" defTabSz="914400" rtl="0" eaLnBrk="1" latinLnBrk="0" hangingPunct="1">
-              <a:defRPr sz="1800" kern="1200">
-                <a:solidFill>
-                  <a:schemeClr val="tx1"/>
-                </a:solidFill>
-                <a:latin typeface="+mn-lt"/>
-                <a:ea typeface="+mn-ea"/>
-                <a:cs typeface="+mn-cs"/>
-              </a:defRPr>
-            </a:lvl5pPr>
-            <a:lvl6pPr marL="2286000" algn="l" defTabSz="914400" rtl="0" eaLnBrk="1" latinLnBrk="0" hangingPunct="1">
-              <a:defRPr sz="1800" kern="1200">
-                <a:solidFill>
-                  <a:schemeClr val="tx1"/>
-                </a:solidFill>
-                <a:latin typeface="+mn-lt"/>
-                <a:ea typeface="+mn-ea"/>
-                <a:cs typeface="+mn-cs"/>
-              </a:defRPr>
-            </a:lvl6pPr>
-            <a:lvl7pPr marL="2743200" algn="l" defTabSz="914400" rtl="0" eaLnBrk="1" latinLnBrk="0" hangingPunct="1">
-              <a:defRPr sz="1800" kern="1200">
-                <a:solidFill>
-                  <a:schemeClr val="tx1"/>
-                </a:solidFill>
-                <a:latin typeface="+mn-lt"/>
-                <a:ea typeface="+mn-ea"/>
-                <a:cs typeface="+mn-cs"/>
-              </a:defRPr>
-            </a:lvl7pPr>
-            <a:lvl8pPr marL="3200400" algn="l" defTabSz="914400" rtl="0" eaLnBrk="1" latinLnBrk="0" hangingPunct="1">
-              <a:defRPr sz="1800" kern="1200">
-                <a:solidFill>
-                  <a:schemeClr val="tx1"/>
-                </a:solidFill>
-                <a:latin typeface="+mn-lt"/>
-                <a:ea typeface="+mn-ea"/>
-                <a:cs typeface="+mn-cs"/>
-              </a:defRPr>
-            </a:lvl8pPr>
-            <a:lvl9pPr marL="3657600" algn="l" defTabSz="914400" rtl="0" eaLnBrk="1" latinLnBrk="0" hangingPunct="1">
-              <a:defRPr sz="1800" kern="1200">
-                <a:solidFill>
-                  <a:schemeClr val="tx1"/>
-                </a:solidFill>
-                <a:latin typeface="+mn-lt"/>
-                <a:ea typeface="+mn-ea"/>
-                <a:cs typeface="+mn-cs"/>
-              </a:defRPr>
-            </a:lvl9pPr>
-          </a:lstStyle>
-          <a:p>
-            <a:fld id="{AEFAAC5A-9C4F-4278-920D-DF2BAB595749}" type="slidenum">
-              <a:rPr lang="en-US" smtClean="0"/>
-              <a:pPr/>
-              <a:t>17</a:t>
-            </a:fld>
-            <a:endParaRPr lang="en-US" dirty="0"/>
-          </a:p>
-        </p:txBody>
-      </p:sp>
-      <p:sp>
-        <p:nvSpPr>
-          <p:cNvPr id="8" name="Title 1">
-            <a:extLst>
-              <a:ext uri="{FF2B5EF4-FFF2-40B4-BE49-F238E27FC236}">
-                <a16:creationId xmlns:a16="http://schemas.microsoft.com/office/drawing/2014/main" id="{EC3C299E-CAD7-AD46-BA3F-265522DEDF57}"/>
-              </a:ext>
-            </a:extLst>
-          </p:cNvPr>
-          <p:cNvSpPr>
-            <a:spLocks noGrp="1"/>
-          </p:cNvSpPr>
-          <p:nvPr>
-            <p:ph type="title"/>
-          </p:nvPr>
-        </p:nvSpPr>
-        <p:spPr>
-          <a:xfrm>
-            <a:off x="1143000" y="392112"/>
-            <a:ext cx="7772400" cy="674688"/>
-          </a:xfrm>
-        </p:spPr>
-        <p:txBody>
-          <a:bodyPr>
-            <a:noAutofit/>
-          </a:bodyPr>
-          <a:lstStyle/>
-          <a:p>
-            <a:r>
-              <a:rPr lang="en-US" sz="4000" dirty="0"/>
-              <a:t>Design Considerations</a:t>
-            </a:r>
-          </a:p>
-        </p:txBody>
-      </p:sp>
-    </p:spTree>
-    <p:extLst>
-      <p:ext uri="{BB962C8B-B14F-4D97-AF65-F5344CB8AC3E}">
-        <p14:creationId xmlns:p14="http://schemas.microsoft.com/office/powerpoint/2010/main" val="1425732872"/>
-      </p:ext>
-    </p:extLst>
-  </p:cSld>
-  <p:clrMapOvr>
-    <a:masterClrMapping/>
-  </p:clrMapOvr>
-</p:sld>
-</file>
-
 <file path=ppt/slides/slide18.xml><?xml version="1.0" encoding="utf-8"?>
 <p:sld xmlns:a="http://schemas.openxmlformats.org/drawingml/2006/main" xmlns:r="http://schemas.openxmlformats.org/officeDocument/2006/relationships" xmlns:p="http://schemas.openxmlformats.org/presentationml/2006/main">
   <p:cSld>
@@ -10461,18 +10382,6 @@
             </a:r>
           </a:p>
           <a:p>
-            <a:pPr lvl="1"/>
-            <a:r>
-              <a:rPr lang="en-US" dirty="0"/>
-              <a:t>Keep API independent of </a:t>
-            </a:r>
-            <a:r>
-              <a:rPr lang="en-US" dirty="0" err="1"/>
-              <a:t>numerics</a:t>
-            </a:r>
-            <a:endParaRPr lang="en-US" dirty="0"/>
-          </a:p>
-          <a:p>
             <a:r>
               <a:rPr lang="en-US" dirty="0"/>
               <a:t>Simple is better</a:t>
@@ -10620,7 +10529,7 @@
             <a:fld id="{B557289E-1B3F-4E63-935A-0E0E5EBBCF05}" type="datetime1">
               <a:rPr lang="en-US" smtClean="0"/>
               <a:pPr/>
-              <a:t>7/29/20</a:t>
+              <a:t>7/31/20</a:t>
             </a:fld>
             <a:endParaRPr lang="en-US"/>
           </a:p>
@@ -10753,6 +10662,477 @@
               <a:rPr lang="en-US" smtClean="0"/>
               <a:pPr/>
               <a:t>18</a:t>
+            </a:fld>
+            <a:endParaRPr lang="en-US" dirty="0"/>
+          </a:p>
+        </p:txBody>
+      </p:sp>
+      <p:sp>
+        <p:nvSpPr>
+          <p:cNvPr id="8" name="Title 1">
+            <a:extLst>
+              <a:ext uri="{FF2B5EF4-FFF2-40B4-BE49-F238E27FC236}">
+                <a16:creationId xmlns:a16="http://schemas.microsoft.com/office/drawing/2014/main" id="{EC3C299E-CAD7-AD46-BA3F-265522DEDF57}"/>
+              </a:ext>
+            </a:extLst>
+          </p:cNvPr>
+          <p:cNvSpPr>
+            <a:spLocks noGrp="1"/>
+          </p:cNvSpPr>
+          <p:nvPr>
+            <p:ph type="title"/>
+          </p:nvPr>
+        </p:nvSpPr>
+        <p:spPr>
+          <a:xfrm>
+            <a:off x="1143000" y="392112"/>
+            <a:ext cx="7772400" cy="674688"/>
+          </a:xfrm>
+        </p:spPr>
+        <p:txBody>
+          <a:bodyPr>
+            <a:noAutofit/>
+          </a:bodyPr>
+          <a:lstStyle/>
+          <a:p>
+            <a:r>
+              <a:rPr lang="en-US" sz="4000" dirty="0"/>
+              <a:t>Design Considerations</a:t>
+            </a:r>
+          </a:p>
+        </p:txBody>
+      </p:sp>
+    </p:spTree>
+    <p:extLst>
+      <p:ext uri="{BB962C8B-B14F-4D97-AF65-F5344CB8AC3E}">
+        <p14:creationId xmlns:p14="http://schemas.microsoft.com/office/powerpoint/2010/main" val="1425732872"/>
+      </p:ext>
+    </p:extLst>
+  </p:cSld>
+  <p:clrMapOvr>
+    <a:masterClrMapping/>
+  </p:clrMapOvr>
+</p:sld>
+</file>
+
+<file path=ppt/slides/slide19.xml><?xml version="1.0" encoding="utf-8"?>
+<p:sld xmlns:a="http://schemas.openxmlformats.org/drawingml/2006/main" xmlns:r="http://schemas.openxmlformats.org/officeDocument/2006/relationships" xmlns:p="http://schemas.openxmlformats.org/presentationml/2006/main">
+  <p:cSld>
+    <p:spTree>
+      <p:nvGrpSpPr>
+        <p:cNvPr id="1" name=""/>
+        <p:cNvGrpSpPr/>
+        <p:nvPr/>
+      </p:nvGrpSpPr>
+      <p:grpSpPr>
+        <a:xfrm>
+          <a:off x="0" y="0"/>
+          <a:ext cx="0" cy="0"/>
+          <a:chOff x="0" y="0"/>
+          <a:chExt cx="0" cy="0"/>
+        </a:xfrm>
+      </p:grpSpPr>
+      <p:sp>
+        <p:nvSpPr>
+          <p:cNvPr id="10" name="Rectangle 9">
+            <a:extLst>
+              <a:ext uri="{FF2B5EF4-FFF2-40B4-BE49-F238E27FC236}">
+                <a16:creationId xmlns:a16="http://schemas.microsoft.com/office/drawing/2014/main" id="{3E7EC149-0D6E-EA43-BEFD-0D592A41CAD3}"/>
+              </a:ext>
+            </a:extLst>
+          </p:cNvPr>
+          <p:cNvSpPr/>
+          <p:nvPr/>
+        </p:nvSpPr>
+        <p:spPr>
+          <a:xfrm>
+            <a:off x="166255" y="1550177"/>
+            <a:ext cx="5403273" cy="4241023"/>
+          </a:xfrm>
+          <a:prstGeom prst="rect">
+            <a:avLst/>
+          </a:prstGeom>
+          <a:solidFill>
+            <a:schemeClr val="accent3"/>
+          </a:solidFill>
+          <a:ln>
+            <a:noFill/>
+          </a:ln>
+          <a:effectLst>
+            <a:outerShdw blurRad="44450" dist="27940" dir="5400000" algn="ctr">
+              <a:srgbClr val="000000">
+                <a:alpha val="32000"/>
+              </a:srgbClr>
+            </a:outerShdw>
+          </a:effectLst>
+        </p:spPr>
+        <p:txBody>
+          <a:bodyPr rot="0" spcFirstLastPara="0" vertOverflow="overflow" horzOverflow="overflow" vert="horz" wrap="square" lIns="121851" tIns="60925" rIns="121851" bIns="60925" numCol="1" spcCol="0" rtlCol="0" fromWordArt="0" anchor="ctr" anchorCtr="0" forceAA="0" compatLnSpc="1">
+            <a:prstTxWarp prst="textNoShape">
+              <a:avLst/>
+            </a:prstTxWarp>
+            <a:noAutofit/>
+          </a:bodyPr>
+          <a:lstStyle/>
+          <a:p>
+            <a:pPr algn="ctr">
+              <a:lnSpc>
+                <a:spcPct val="90000"/>
+              </a:lnSpc>
+            </a:pPr>
+            <a:endParaRPr lang="en-US" sz="2000" dirty="0">
+              <a:solidFill>
+                <a:schemeClr val="bg1"/>
+              </a:solidFill>
+            </a:endParaRPr>
+          </a:p>
+        </p:txBody>
+      </p:sp>
+      <p:sp>
+        <p:nvSpPr>
+          <p:cNvPr id="3" name="Content Placeholder 2">
+            <a:extLst>
+              <a:ext uri="{FF2B5EF4-FFF2-40B4-BE49-F238E27FC236}">
+                <a16:creationId xmlns:a16="http://schemas.microsoft.com/office/drawing/2014/main" id="{36D087C7-F6DB-6246-BA7E-84DE6BC80227}"/>
+              </a:ext>
+            </a:extLst>
+          </p:cNvPr>
+          <p:cNvSpPr>
+            <a:spLocks noGrp="1"/>
+          </p:cNvSpPr>
+          <p:nvPr>
+            <p:ph idx="1"/>
+          </p:nvPr>
+        </p:nvSpPr>
+        <p:spPr>
+          <a:xfrm>
+            <a:off x="282633" y="1688722"/>
+            <a:ext cx="5286895" cy="4102478"/>
+          </a:xfrm>
+        </p:spPr>
+        <p:txBody>
+          <a:bodyPr/>
+          <a:lstStyle/>
+          <a:p>
+            <a:r>
+              <a:rPr lang="en-US" dirty="0"/>
+              <a:t>Infrastructure design</a:t>
+            </a:r>
+          </a:p>
+          <a:p>
+            <a:pPr lvl="1"/>
+            <a:r>
+              <a:rPr lang="en-US" dirty="0"/>
+              <a:t>Take time to discuss, iterate over requirements and specification</a:t>
+            </a:r>
+          </a:p>
+          <a:p>
+            <a:pPr lvl="1"/>
+            <a:r>
+              <a:rPr lang="en-US" dirty="0"/>
+              <a:t>Keep end users involved </a:t>
+            </a:r>
+          </a:p>
+          <a:p>
+            <a:pPr lvl="2"/>
+            <a:r>
+              <a:rPr lang="en-US" dirty="0"/>
+              <a:t>Not doing so leaves possible options on the table</a:t>
+            </a:r>
+          </a:p>
+          <a:p>
+            <a:pPr lvl="1"/>
+            <a:r>
+              <a:rPr lang="en-US" dirty="0"/>
+              <a:t>Keep API independent of </a:t>
+            </a:r>
+            <a:r>
+              <a:rPr lang="en-US" dirty="0" err="1"/>
+              <a:t>numerics</a:t>
+            </a:r>
+            <a:endParaRPr lang="en-US" dirty="0"/>
+          </a:p>
+          <a:p>
+            <a:r>
+              <a:rPr lang="en-US" dirty="0"/>
+              <a:t>Simple is better</a:t>
+            </a:r>
+          </a:p>
+          <a:p>
+            <a:pPr lvl="1"/>
+            <a:r>
+              <a:rPr lang="en-US" dirty="0"/>
+              <a:t>Flexibility Vs transparent to the user</a:t>
+            </a:r>
+          </a:p>
+          <a:p>
+            <a:pPr lvl="2"/>
+            <a:r>
+              <a:rPr lang="en-US" dirty="0"/>
+              <a:t>Flexibility wins</a:t>
+            </a:r>
+          </a:p>
+        </p:txBody>
+      </p:sp>
+      <p:sp>
+        <p:nvSpPr>
+          <p:cNvPr id="4" name="Date Placeholder 3">
+            <a:extLst>
+              <a:ext uri="{FF2B5EF4-FFF2-40B4-BE49-F238E27FC236}">
+                <a16:creationId xmlns:a16="http://schemas.microsoft.com/office/drawing/2014/main" id="{B2C88E49-3CEB-584A-AFB2-5B51EA707452}"/>
+              </a:ext>
+            </a:extLst>
+          </p:cNvPr>
+          <p:cNvSpPr>
+            <a:spLocks noGrp="1"/>
+          </p:cNvSpPr>
+          <p:nvPr>
+            <p:ph type="dt" sz="half" idx="10"/>
+          </p:nvPr>
+        </p:nvSpPr>
+        <p:spPr>
+          <a:xfrm>
+            <a:off x="6858000" y="6356350"/>
+            <a:ext cx="1600200" cy="274320"/>
+          </a:xfrm>
+          <a:prstGeom prst="rect">
+            <a:avLst/>
+          </a:prstGeom>
+        </p:spPr>
+        <p:txBody>
+          <a:bodyPr vert="horz" lIns="91440" tIns="45720" rIns="91440" bIns="45720" rtlCol="0" anchor="ctr" anchorCtr="0"/>
+          <a:lstStyle>
+            <a:defPPr>
+              <a:defRPr lang="en-US"/>
+            </a:defPPr>
+            <a:lvl1pPr marL="0" algn="r" defTabSz="914400" rtl="0" eaLnBrk="1" latinLnBrk="0" hangingPunct="1">
+              <a:defRPr sz="1100" kern="1200">
+                <a:solidFill>
+                  <a:schemeClr val="tx1"/>
+                </a:solidFill>
+                <a:latin typeface="Arial" panose="020B0604020202020204" pitchFamily="34" charset="0"/>
+                <a:ea typeface="+mn-ea"/>
+                <a:cs typeface="Arial" panose="020B0604020202020204" pitchFamily="34" charset="0"/>
+              </a:defRPr>
+            </a:lvl1pPr>
+            <a:lvl2pPr marL="457200" algn="l" defTabSz="914400" rtl="0" eaLnBrk="1" latinLnBrk="0" hangingPunct="1">
+              <a:defRPr sz="1800" kern="1200">
+                <a:solidFill>
+                  <a:schemeClr val="tx1"/>
+                </a:solidFill>
+                <a:latin typeface="+mn-lt"/>
+                <a:ea typeface="+mn-ea"/>
+                <a:cs typeface="+mn-cs"/>
+              </a:defRPr>
+            </a:lvl2pPr>
+            <a:lvl3pPr marL="914400" algn="l" defTabSz="914400" rtl="0" eaLnBrk="1" latinLnBrk="0" hangingPunct="1">
+              <a:defRPr sz="1800" kern="1200">
+                <a:solidFill>
+                  <a:schemeClr val="tx1"/>
+                </a:solidFill>
+                <a:latin typeface="+mn-lt"/>
+                <a:ea typeface="+mn-ea"/>
+                <a:cs typeface="+mn-cs"/>
+              </a:defRPr>
+            </a:lvl3pPr>
+            <a:lvl4pPr marL="1371600" algn="l" defTabSz="914400" rtl="0" eaLnBrk="1" latinLnBrk="0" hangingPunct="1">
+              <a:defRPr sz="1800" kern="1200">
+                <a:solidFill>
+                  <a:schemeClr val="tx1"/>
+                </a:solidFill>
+                <a:latin typeface="+mn-lt"/>
+                <a:ea typeface="+mn-ea"/>
+                <a:cs typeface="+mn-cs"/>
+              </a:defRPr>
+            </a:lvl4pPr>
+            <a:lvl5pPr marL="1828800" algn="l" defTabSz="914400" rtl="0" eaLnBrk="1" latinLnBrk="0" hangingPunct="1">
+              <a:defRPr sz="1800" kern="1200">
+                <a:solidFill>
+                  <a:schemeClr val="tx1"/>
+                </a:solidFill>
+                <a:latin typeface="+mn-lt"/>
+                <a:ea typeface="+mn-ea"/>
+                <a:cs typeface="+mn-cs"/>
+              </a:defRPr>
+            </a:lvl5pPr>
+            <a:lvl6pPr marL="2286000" algn="l" defTabSz="914400" rtl="0" eaLnBrk="1" latinLnBrk="0" hangingPunct="1">
+              <a:defRPr sz="1800" kern="1200">
+                <a:solidFill>
+                  <a:schemeClr val="tx1"/>
+                </a:solidFill>
+                <a:latin typeface="+mn-lt"/>
+                <a:ea typeface="+mn-ea"/>
+                <a:cs typeface="+mn-cs"/>
+              </a:defRPr>
+            </a:lvl6pPr>
+            <a:lvl7pPr marL="2743200" algn="l" defTabSz="914400" rtl="0" eaLnBrk="1" latinLnBrk="0" hangingPunct="1">
+              <a:defRPr sz="1800" kern="1200">
+                <a:solidFill>
+                  <a:schemeClr val="tx1"/>
+                </a:solidFill>
+                <a:latin typeface="+mn-lt"/>
+                <a:ea typeface="+mn-ea"/>
+                <a:cs typeface="+mn-cs"/>
+              </a:defRPr>
+            </a:lvl7pPr>
+            <a:lvl8pPr marL="3200400" algn="l" defTabSz="914400" rtl="0" eaLnBrk="1" latinLnBrk="0" hangingPunct="1">
+              <a:defRPr sz="1800" kern="1200">
+                <a:solidFill>
+                  <a:schemeClr val="tx1"/>
+                </a:solidFill>
+                <a:latin typeface="+mn-lt"/>
+                <a:ea typeface="+mn-ea"/>
+                <a:cs typeface="+mn-cs"/>
+              </a:defRPr>
+            </a:lvl8pPr>
+            <a:lvl9pPr marL="3657600" algn="l" defTabSz="914400" rtl="0" eaLnBrk="1" latinLnBrk="0" hangingPunct="1">
+              <a:defRPr sz="1800" kern="1200">
+                <a:solidFill>
+                  <a:schemeClr val="tx1"/>
+                </a:solidFill>
+                <a:latin typeface="+mn-lt"/>
+                <a:ea typeface="+mn-ea"/>
+                <a:cs typeface="+mn-cs"/>
+              </a:defRPr>
+            </a:lvl9pPr>
+          </a:lstStyle>
+          <a:p>
+            <a:fld id="{B557289E-1B3F-4E63-935A-0E0E5EBBCF05}" type="datetime1">
+              <a:rPr lang="en-US" smtClean="0"/>
+              <a:pPr/>
+              <a:t>7/31/20</a:t>
+            </a:fld>
+            <a:endParaRPr lang="en-US"/>
+          </a:p>
+        </p:txBody>
+      </p:sp>
+      <p:sp>
+        <p:nvSpPr>
+          <p:cNvPr id="5" name="Slide Number Placeholder 4">
+            <a:extLst>
+              <a:ext uri="{FF2B5EF4-FFF2-40B4-BE49-F238E27FC236}">
+                <a16:creationId xmlns:a16="http://schemas.microsoft.com/office/drawing/2014/main" id="{B05AEFD1-E907-E749-8CE9-8AC2C9DDB011}"/>
+              </a:ext>
+            </a:extLst>
+          </p:cNvPr>
+          <p:cNvSpPr>
+            <a:spLocks noGrp="1"/>
+          </p:cNvSpPr>
+          <p:nvPr>
+            <p:ph type="sldNum" sz="quarter" idx="12"/>
+          </p:nvPr>
+        </p:nvSpPr>
+        <p:spPr>
+          <a:xfrm>
+            <a:off x="8458200" y="6356350"/>
+            <a:ext cx="457200" cy="274320"/>
+          </a:xfrm>
+          <a:prstGeom prst="rect">
+            <a:avLst/>
+          </a:prstGeom>
+        </p:spPr>
+        <p:txBody>
+          <a:bodyPr vert="horz" lIns="91440" tIns="45720" rIns="91440" bIns="45720" rtlCol="0" anchor="ctr" anchorCtr="0"/>
+          <a:lstStyle>
+            <a:defPPr>
+              <a:defRPr lang="en-US"/>
+            </a:defPPr>
+            <a:lvl1pPr marL="0" algn="r" defTabSz="914400" rtl="0" eaLnBrk="1" latinLnBrk="0" hangingPunct="1">
+              <a:defRPr sz="1100" kern="1200">
+                <a:solidFill>
+                  <a:schemeClr val="tx1"/>
+                </a:solidFill>
+                <a:latin typeface="Arial" panose="020B0604020202020204" pitchFamily="34" charset="0"/>
+                <a:ea typeface="+mn-ea"/>
+                <a:cs typeface="Arial" panose="020B0604020202020204" pitchFamily="34" charset="0"/>
+              </a:defRPr>
+            </a:lvl1pPr>
+            <a:lvl2pPr marL="457200" algn="l" defTabSz="914400" rtl="0" eaLnBrk="1" latinLnBrk="0" hangingPunct="1">
+              <a:defRPr sz="1800" kern="1200">
+                <a:solidFill>
+                  <a:schemeClr val="tx1"/>
+                </a:solidFill>
+                <a:latin typeface="+mn-lt"/>
+                <a:ea typeface="+mn-ea"/>
+                <a:cs typeface="+mn-cs"/>
+              </a:defRPr>
+            </a:lvl2pPr>
+            <a:lvl3pPr marL="914400" algn="l" defTabSz="914400" rtl="0" eaLnBrk="1" latinLnBrk="0" hangingPunct="1">
+              <a:defRPr sz="1800" kern="1200">
+                <a:solidFill>
+                  <a:schemeClr val="tx1"/>
+                </a:solidFill>
+                <a:latin typeface="+mn-lt"/>
+                <a:ea typeface="+mn-ea"/>
+                <a:cs typeface="+mn-cs"/>
+              </a:defRPr>
+            </a:lvl3pPr>
+            <a:lvl4pPr marL="1371600" algn="l" defTabSz="914400" rtl="0" eaLnBrk="1" latinLnBrk="0" hangingPunct="1">
+              <a:defRPr sz="1800" kern="1200">
+                <a:solidFill>
+                  <a:schemeClr val="tx1"/>
+                </a:solidFill>
+                <a:latin typeface="+mn-lt"/>
+                <a:ea typeface="+mn-ea"/>
+                <a:cs typeface="+mn-cs"/>
+              </a:defRPr>
+            </a:lvl4pPr>
+            <a:lvl5pPr marL="1828800" algn="l" defTabSz="914400" rtl="0" eaLnBrk="1" latinLnBrk="0" hangingPunct="1">
+              <a:defRPr sz="1800" kern="1200">
+                <a:solidFill>
+                  <a:schemeClr val="tx1"/>
+                </a:solidFill>
+                <a:latin typeface="+mn-lt"/>
+                <a:ea typeface="+mn-ea"/>
+                <a:cs typeface="+mn-cs"/>
+              </a:defRPr>
+            </a:lvl5pPr>
+            <a:lvl6pPr marL="2286000" algn="l" defTabSz="914400" rtl="0" eaLnBrk="1" latinLnBrk="0" hangingPunct="1">
+              <a:defRPr sz="1800" kern="1200">
+                <a:solidFill>
+                  <a:schemeClr val="tx1"/>
+                </a:solidFill>
+                <a:latin typeface="+mn-lt"/>
+                <a:ea typeface="+mn-ea"/>
+                <a:cs typeface="+mn-cs"/>
+              </a:defRPr>
+            </a:lvl6pPr>
+            <a:lvl7pPr marL="2743200" algn="l" defTabSz="914400" rtl="0" eaLnBrk="1" latinLnBrk="0" hangingPunct="1">
+              <a:defRPr sz="1800" kern="1200">
+                <a:solidFill>
+                  <a:schemeClr val="tx1"/>
+                </a:solidFill>
+                <a:latin typeface="+mn-lt"/>
+                <a:ea typeface="+mn-ea"/>
+                <a:cs typeface="+mn-cs"/>
+              </a:defRPr>
+            </a:lvl7pPr>
+            <a:lvl8pPr marL="3200400" algn="l" defTabSz="914400" rtl="0" eaLnBrk="1" latinLnBrk="0" hangingPunct="1">
+              <a:defRPr sz="1800" kern="1200">
+                <a:solidFill>
+                  <a:schemeClr val="tx1"/>
+                </a:solidFill>
+                <a:latin typeface="+mn-lt"/>
+                <a:ea typeface="+mn-ea"/>
+                <a:cs typeface="+mn-cs"/>
+              </a:defRPr>
+            </a:lvl8pPr>
+            <a:lvl9pPr marL="3657600" algn="l" defTabSz="914400" rtl="0" eaLnBrk="1" latinLnBrk="0" hangingPunct="1">
+              <a:defRPr sz="1800" kern="1200">
+                <a:solidFill>
+                  <a:schemeClr val="tx1"/>
+                </a:solidFill>
+                <a:latin typeface="+mn-lt"/>
+                <a:ea typeface="+mn-ea"/>
+                <a:cs typeface="+mn-cs"/>
+              </a:defRPr>
+            </a:lvl9pPr>
+          </a:lstStyle>
+          <a:p>
+            <a:fld id="{AEFAAC5A-9C4F-4278-920D-DF2BAB595749}" type="slidenum">
+              <a:rPr lang="en-US" smtClean="0"/>
+              <a:pPr/>
+              <a:t>19</a:t>
             </a:fld>
             <a:endParaRPr lang="en-US" dirty="0"/>
           </a:p>
@@ -11136,102 +11516,6 @@
     <p:extLst>
       <p:ext uri="{BB962C8B-B14F-4D97-AF65-F5344CB8AC3E}">
         <p14:creationId xmlns:p14="http://schemas.microsoft.com/office/powerpoint/2010/main" val="3142201076"/>
-      </p:ext>
-    </p:extLst>
-  </p:cSld>
-  <p:clrMapOvr>
-    <a:masterClrMapping/>
-  </p:clrMapOvr>
-</p:sld>
-</file>
-
-<file path=ppt/slides/slide19.xml><?xml version="1.0" encoding="utf-8"?>
-<p:sld xmlns:a="http://schemas.openxmlformats.org/drawingml/2006/main" xmlns:r="http://schemas.openxmlformats.org/officeDocument/2006/relationships" xmlns:p="http://schemas.openxmlformats.org/presentationml/2006/main">
-  <p:cSld>
-    <p:spTree>
-      <p:nvGrpSpPr>
-        <p:cNvPr id="1" name=""/>
-        <p:cNvGrpSpPr/>
-        <p:nvPr/>
-      </p:nvGrpSpPr>
-      <p:grpSpPr>
-        <a:xfrm>
-          <a:off x="0" y="0"/>
-          <a:ext cx="0" cy="0"/>
-          <a:chOff x="0" y="0"/>
-          <a:chExt cx="0" cy="0"/>
-        </a:xfrm>
-      </p:grpSpPr>
-      <p:pic>
-        <p:nvPicPr>
-          <p:cNvPr id="4" name="Picture 3">
-            <a:extLst>
-              <a:ext uri="{FF2B5EF4-FFF2-40B4-BE49-F238E27FC236}">
-                <a16:creationId xmlns:a16="http://schemas.microsoft.com/office/drawing/2014/main" id="{FB38DDAD-3F9C-AC4F-A5FD-450E33F06672}"/>
-              </a:ext>
-            </a:extLst>
-          </p:cNvPr>
-          <p:cNvPicPr>
-            <a:picLocks noChangeAspect="1"/>
-          </p:cNvPicPr>
-          <p:nvPr/>
-        </p:nvPicPr>
-        <p:blipFill>
-          <a:blip r:embed="rId2"/>
-          <a:stretch>
-            <a:fillRect/>
-          </a:stretch>
-        </p:blipFill>
-        <p:spPr>
-          <a:xfrm>
-            <a:off x="413657" y="1024714"/>
-            <a:ext cx="8493644" cy="4808571"/>
-          </a:xfrm>
-          <a:prstGeom prst="rect">
-            <a:avLst/>
-          </a:prstGeom>
-        </p:spPr>
-      </p:pic>
-      <p:sp>
-        <p:nvSpPr>
-          <p:cNvPr id="3" name="Title 1">
-            <a:extLst>
-              <a:ext uri="{FF2B5EF4-FFF2-40B4-BE49-F238E27FC236}">
-                <a16:creationId xmlns:a16="http://schemas.microsoft.com/office/drawing/2014/main" id="{1C7A2BF5-DB7A-E642-B501-8F10E157011B}"/>
-              </a:ext>
-            </a:extLst>
-          </p:cNvPr>
-          <p:cNvSpPr>
-            <a:spLocks noGrp="1"/>
-          </p:cNvSpPr>
-          <p:nvPr>
-            <p:ph type="title"/>
-          </p:nvPr>
-        </p:nvSpPr>
-        <p:spPr>
-          <a:xfrm>
-            <a:off x="413657" y="0"/>
-            <a:ext cx="11372473" cy="914400"/>
-          </a:xfrm>
-        </p:spPr>
-        <p:txBody>
-          <a:bodyPr/>
-          <a:lstStyle/>
-          <a:p>
-            <a:br>
-              <a:rPr lang="en-US" dirty="0"/>
-            </a:br>
-            <a:r>
-              <a:rPr lang="en-US" dirty="0"/>
-              <a:t>The Running Example</a:t>
-            </a:r>
-          </a:p>
-        </p:txBody>
-      </p:sp>
-    </p:spTree>
-    <p:extLst>
-      <p:ext uri="{BB962C8B-B14F-4D97-AF65-F5344CB8AC3E}">
-        <p14:creationId xmlns:p14="http://schemas.microsoft.com/office/powerpoint/2010/main" val="3842836062"/>
       </p:ext>
     </p:extLst>
   </p:cSld>
@@ -11355,15 +11639,24 @@
             </a:pPr>
             <a:r>
               <a:rPr lang="en-US" sz="1800" b="1" dirty="0"/>
-              <a:t>The requested citation the overall tutorial</a:t>
-            </a:r>
-          </a:p>
-          <a:p>
-            <a:pPr>
-              <a:spcBef>
-                <a:spcPts val="400"/>
-              </a:spcBef>
-            </a:pPr>
+              <a:t>The requested citation the overall tutorial is: David </a:t>
+            </a:r>
+            <a:r>
+              <a:rPr lang="en-US" sz="1800" b="1" dirty="0" err="1"/>
+              <a:t>Bernholdt</a:t>
+            </a:r>
+            <a:r>
+              <a:rPr lang="en-US" sz="1800" b="1" dirty="0"/>
+              <a:t>, Software Productivity Track, in Argonne Training Program for Extreme </a:t>
+            </a:r>
+            <a:r>
+              <a:rPr lang="en-US" sz="1800" b="1"/>
+              <a:t>Scale Computing 2020. </a:t>
+            </a:r>
+            <a:r>
+              <a:rPr lang="en-US" sz="1800" b="1" dirty="0"/>
+              <a:t>DOI: </a:t>
+            </a:r>
             <a:r>
               <a:rPr lang="en-US" sz="1800" dirty="0"/>
               <a:t>Individual modules may be cited as </a:t>
@@ -11374,7 +11667,7 @@
             </a:r>
             <a:r>
               <a:rPr lang="en-US" sz="1800" dirty="0"/>
-              <a:t>, in ATPESC…</a:t>
+              <a:t>, in Software Productivity Track, ATPESC 2020</a:t>
             </a:r>
           </a:p>
           <a:p>
@@ -11394,15 +11687,15 @@
             </a:pPr>
             <a:r>
               <a:rPr lang="en-US" sz="1600" dirty="0"/>
-              <a:t>Additional contributors to this this track include: Anshu Dubey, David </a:t>
+              <a:t>Additional contributors to this this tutorial include: Anshu Dubey, Katherine Riley, James M. </a:t>
             </a:r>
             <a:r>
               <a:rPr lang="en-US" sz="1600" dirty="0" err="1"/>
-              <a:t>Bernholdt</a:t>
+              <a:t>Willenbring</a:t>
             </a:r>
             <a:r>
               <a:rPr lang="en-US" sz="1600" dirty="0"/>
-              <a:t>, Mike </a:t>
+              <a:t>, Mark Miller, Mike </a:t>
             </a:r>
             <a:r>
               <a:rPr lang="en-US" sz="1600" dirty="0" err="1"/>
@@ -11410,13 +11703,16 @@
             </a:r>
             <a:r>
               <a:rPr lang="en-US" sz="1600" dirty="0"/>
-              <a:t>, Jared O’Neal, and Katherine Riley, James M. </a:t>
+              <a:t>, Alicia </a:t>
             </a:r>
             <a:r>
               <a:rPr lang="en-US" sz="1600" dirty="0" err="1"/>
-              <a:t>Willenbring</a:t>
-            </a:r>
-            <a:endParaRPr lang="en-US" sz="1600" dirty="0"/>
+              <a:t>Klinvex</a:t>
+            </a:r>
+            <a:r>
+              <a:rPr lang="en-US" sz="1600" dirty="0"/>
+              <a:t>, and Jared O’Neal,</a:t>
+            </a:r>
           </a:p>
           <a:p>
             <a:pPr>
@@ -11450,15 +11746,7 @@
             </a:pPr>
             <a:r>
               <a:rPr lang="en-US" sz="1600" dirty="0"/>
-              <a:t>This work was performed in part at the Argonne National Laboratory, which is managed </a:t>
-            </a:r>
-            <a:r>
-              <a:rPr lang="en-US" sz="1600" dirty="0" err="1"/>
-              <a:t>managed</a:t>
-            </a:r>
-            <a:r>
-              <a:rPr lang="en-US" sz="1600" dirty="0"/>
-              <a:t> by </a:t>
+              <a:t>This work was performed in part at the Argonne National Laboratory, which is managed by </a:t>
             </a:r>
             <a:r>
               <a:rPr lang="en-US" sz="1600" dirty="0" err="1"/>
@@ -11543,7 +11831,7 @@
     </p:spTree>
     <p:extLst>
       <p:ext uri="{BB962C8B-B14F-4D97-AF65-F5344CB8AC3E}">
-        <p14:creationId xmlns:p14="http://schemas.microsoft.com/office/powerpoint/2010/main" val="978726433"/>
+        <p14:creationId xmlns:p14="http://schemas.microsoft.com/office/powerpoint/2010/main" val="4192528843"/>
       </p:ext>
     </p:extLst>
   </p:cSld>
@@ -11554,6 +11842,102 @@
 </file>
 
 <file path=ppt/slides/slide20.xml><?xml version="1.0" encoding="utf-8"?>
+<p:sld xmlns:a="http://schemas.openxmlformats.org/drawingml/2006/main" xmlns:r="http://schemas.openxmlformats.org/officeDocument/2006/relationships" xmlns:p="http://schemas.openxmlformats.org/presentationml/2006/main">
+  <p:cSld>
+    <p:spTree>
+      <p:nvGrpSpPr>
+        <p:cNvPr id="1" name=""/>
+        <p:cNvGrpSpPr/>
+        <p:nvPr/>
+      </p:nvGrpSpPr>
+      <p:grpSpPr>
+        <a:xfrm>
+          <a:off x="0" y="0"/>
+          <a:ext cx="0" cy="0"/>
+          <a:chOff x="0" y="0"/>
+          <a:chExt cx="0" cy="0"/>
+        </a:xfrm>
+      </p:grpSpPr>
+      <p:pic>
+        <p:nvPicPr>
+          <p:cNvPr id="4" name="Picture 3">
+            <a:extLst>
+              <a:ext uri="{FF2B5EF4-FFF2-40B4-BE49-F238E27FC236}">
+                <a16:creationId xmlns:a16="http://schemas.microsoft.com/office/drawing/2014/main" id="{FB38DDAD-3F9C-AC4F-A5FD-450E33F06672}"/>
+              </a:ext>
+            </a:extLst>
+          </p:cNvPr>
+          <p:cNvPicPr>
+            <a:picLocks noChangeAspect="1"/>
+          </p:cNvPicPr>
+          <p:nvPr/>
+        </p:nvPicPr>
+        <p:blipFill>
+          <a:blip r:embed="rId2"/>
+          <a:stretch>
+            <a:fillRect/>
+          </a:stretch>
+        </p:blipFill>
+        <p:spPr>
+          <a:xfrm>
+            <a:off x="413657" y="1024714"/>
+            <a:ext cx="8493644" cy="4808571"/>
+          </a:xfrm>
+          <a:prstGeom prst="rect">
+            <a:avLst/>
+          </a:prstGeom>
+        </p:spPr>
+      </p:pic>
+      <p:sp>
+        <p:nvSpPr>
+          <p:cNvPr id="3" name="Title 1">
+            <a:extLst>
+              <a:ext uri="{FF2B5EF4-FFF2-40B4-BE49-F238E27FC236}">
+                <a16:creationId xmlns:a16="http://schemas.microsoft.com/office/drawing/2014/main" id="{1C7A2BF5-DB7A-E642-B501-8F10E157011B}"/>
+              </a:ext>
+            </a:extLst>
+          </p:cNvPr>
+          <p:cNvSpPr>
+            <a:spLocks noGrp="1"/>
+          </p:cNvSpPr>
+          <p:nvPr>
+            <p:ph type="title"/>
+          </p:nvPr>
+        </p:nvSpPr>
+        <p:spPr>
+          <a:xfrm>
+            <a:off x="413657" y="0"/>
+            <a:ext cx="11372473" cy="914400"/>
+          </a:xfrm>
+        </p:spPr>
+        <p:txBody>
+          <a:bodyPr/>
+          <a:lstStyle/>
+          <a:p>
+            <a:br>
+              <a:rPr lang="en-US" dirty="0"/>
+            </a:br>
+            <a:r>
+              <a:rPr lang="en-US" dirty="0"/>
+              <a:t>The Running Example</a:t>
+            </a:r>
+          </a:p>
+        </p:txBody>
+      </p:sp>
+    </p:spTree>
+    <p:extLst>
+      <p:ext uri="{BB962C8B-B14F-4D97-AF65-F5344CB8AC3E}">
+        <p14:creationId xmlns:p14="http://schemas.microsoft.com/office/powerpoint/2010/main" val="3842836062"/>
+      </p:ext>
+    </p:extLst>
+  </p:cSld>
+  <p:clrMapOvr>
+    <a:masterClrMapping/>
+  </p:clrMapOvr>
+</p:sld>
+</file>
+
+<file path=ppt/slides/slide21.xml><?xml version="1.0" encoding="utf-8"?>
 <p:sld xmlns:a="http://schemas.openxmlformats.org/drawingml/2006/main" xmlns:r="http://schemas.openxmlformats.org/officeDocument/2006/relationships" xmlns:p="http://schemas.openxmlformats.org/presentationml/2006/main">
   <p:cSld>
     <p:spTree>
@@ -12399,7 +12783,7 @@
 </p:sld>
 </file>
 
-<file path=ppt/slides/slide21.xml><?xml version="1.0" encoding="utf-8"?>
+<file path=ppt/slides/slide22.xml><?xml version="1.0" encoding="utf-8"?>
 <p:sld xmlns:a="http://schemas.openxmlformats.org/drawingml/2006/main" xmlns:r="http://schemas.openxmlformats.org/officeDocument/2006/relationships" xmlns:p="http://schemas.openxmlformats.org/presentationml/2006/main">
   <p:cSld>
     <p:spTree>
@@ -12542,7 +12926,7 @@
             <a:fld id="{B557289E-1B3F-4E63-935A-0E0E5EBBCF05}" type="datetime1">
               <a:rPr lang="en-US" smtClean="0"/>
               <a:pPr/>
-              <a:t>7/29/20</a:t>
+              <a:t>7/31/20</a:t>
             </a:fld>
             <a:endParaRPr lang="en-US"/>
           </a:p>
@@ -12674,7 +13058,7 @@
             <a:fld id="{AEFAAC5A-9C4F-4278-920D-DF2BAB595749}" type="slidenum">
               <a:rPr lang="en-US" smtClean="0"/>
               <a:pPr/>
-              <a:t>21</a:t>
+              <a:t>22</a:t>
             </a:fld>
             <a:endParaRPr lang="en-US" dirty="0"/>
           </a:p>
@@ -13041,7 +13425,7 @@
 </p:sld>
 </file>
 
-<file path=ppt/slides/slide22.xml><?xml version="1.0" encoding="utf-8"?>
+<file path=ppt/slides/slide23.xml><?xml version="1.0" encoding="utf-8"?>
 <p:sld xmlns:a="http://schemas.openxmlformats.org/drawingml/2006/main" xmlns:r="http://schemas.openxmlformats.org/officeDocument/2006/relationships" xmlns:p="http://schemas.openxmlformats.org/presentationml/2006/main">
   <p:cSld>
     <p:spTree>
@@ -13248,7 +13632,7 @@
 </p:sld>
 </file>
 
-<file path=ppt/slides/slide23.xml><?xml version="1.0" encoding="utf-8"?>
+<file path=ppt/slides/slide24.xml><?xml version="1.0" encoding="utf-8"?>
 <p:sld xmlns:a="http://schemas.openxmlformats.org/drawingml/2006/main" xmlns:r="http://schemas.openxmlformats.org/officeDocument/2006/relationships" xmlns:p="http://schemas.openxmlformats.org/presentationml/2006/main">
   <p:cSld>
     <p:spTree>
@@ -15546,7 +15930,7 @@
 </p:sld>
 </file>
 
-<file path=ppt/slides/slide24.xml><?xml version="1.0" encoding="utf-8"?>
+<file path=ppt/slides/slide25.xml><?xml version="1.0" encoding="utf-8"?>
 <p:sld xmlns:a="http://schemas.openxmlformats.org/drawingml/2006/main" xmlns:r="http://schemas.openxmlformats.org/officeDocument/2006/relationships" xmlns:p="http://schemas.openxmlformats.org/presentationml/2006/main">
   <p:cSld>
     <p:spTree>
@@ -16824,7 +17208,7 @@
 </p:sld>
 </file>
 
-<file path=ppt/slides/slide25.xml><?xml version="1.0" encoding="utf-8"?>
+<file path=ppt/slides/slide26.xml><?xml version="1.0" encoding="utf-8"?>
 <p:sld xmlns:a="http://schemas.openxmlformats.org/drawingml/2006/main" xmlns:r="http://schemas.openxmlformats.org/officeDocument/2006/relationships" xmlns:p="http://schemas.openxmlformats.org/presentationml/2006/main">
   <p:cSld>
     <p:spTree>
@@ -17023,7 +17407,7 @@
             <a:fld id="{B557289E-1B3F-4E63-935A-0E0E5EBBCF05}" type="datetime1">
               <a:rPr lang="en-US" smtClean="0"/>
               <a:pPr/>
-              <a:t>7/29/20</a:t>
+              <a:t>7/31/20</a:t>
             </a:fld>
             <a:endParaRPr lang="en-US"/>
           </a:p>
@@ -17155,7 +17539,7 @@
             <a:fld id="{AEFAAC5A-9C4F-4278-920D-DF2BAB595749}" type="slidenum">
               <a:rPr lang="en-US" smtClean="0"/>
               <a:pPr/>
-              <a:t>25</a:t>
+              <a:t>26</a:t>
             </a:fld>
             <a:endParaRPr lang="en-US" dirty="0"/>
           </a:p>
@@ -18365,7 +18749,7 @@
 </p:sld>
 </file>
 
-<file path=ppt/slides/slide26.xml><?xml version="1.0" encoding="utf-8"?>
+<file path=ppt/slides/slide27.xml><?xml version="1.0" encoding="utf-8"?>
 <p:sld xmlns:a="http://schemas.openxmlformats.org/drawingml/2006/main" xmlns:r="http://schemas.openxmlformats.org/officeDocument/2006/relationships" xmlns:p="http://schemas.openxmlformats.org/presentationml/2006/main">
   <p:cSld>
     <p:spTree>
@@ -20302,7 +20686,7 @@
 </p:sld>
 </file>
 
-<file path=ppt/slides/slide27.xml><?xml version="1.0" encoding="utf-8"?>
+<file path=ppt/slides/slide28.xml><?xml version="1.0" encoding="utf-8"?>
 <p:sld xmlns:a="http://schemas.openxmlformats.org/drawingml/2006/main" xmlns:r="http://schemas.openxmlformats.org/officeDocument/2006/relationships" xmlns:p="http://schemas.openxmlformats.org/presentationml/2006/main">
   <p:cSld>
     <p:spTree>
@@ -22524,7 +22908,7 @@
 </p:sld>
 </file>
 
-<file path=ppt/slides/slide28.xml><?xml version="1.0" encoding="utf-8"?>
+<file path=ppt/slides/slide29.xml><?xml version="1.0" encoding="utf-8"?>
 <p:sld xmlns:a="http://schemas.openxmlformats.org/drawingml/2006/main" xmlns:r="http://schemas.openxmlformats.org/officeDocument/2006/relationships" xmlns:p="http://schemas.openxmlformats.org/presentationml/2006/main">
   <p:cSld>
     <p:spTree>
@@ -22789,7 +23173,172 @@
 </p:sld>
 </file>
 
-<file path=ppt/slides/slide29.xml><?xml version="1.0" encoding="utf-8"?>
+<file path=ppt/slides/slide3.xml><?xml version="1.0" encoding="utf-8"?>
+<p:sld xmlns:a="http://schemas.openxmlformats.org/drawingml/2006/main" xmlns:r="http://schemas.openxmlformats.org/officeDocument/2006/relationships" xmlns:p="http://schemas.openxmlformats.org/presentationml/2006/main">
+  <p:cSld>
+    <p:spTree>
+      <p:nvGrpSpPr>
+        <p:cNvPr id="1" name=""/>
+        <p:cNvGrpSpPr/>
+        <p:nvPr/>
+      </p:nvGrpSpPr>
+      <p:grpSpPr>
+        <a:xfrm>
+          <a:off x="0" y="0"/>
+          <a:ext cx="0" cy="0"/>
+          <a:chOff x="0" y="0"/>
+          <a:chExt cx="0" cy="0"/>
+        </a:xfrm>
+      </p:grpSpPr>
+      <p:sp>
+        <p:nvSpPr>
+          <p:cNvPr id="3" name="Content Placeholder 2">
+            <a:extLst>
+              <a:ext uri="{FF2B5EF4-FFF2-40B4-BE49-F238E27FC236}">
+                <a16:creationId xmlns:a16="http://schemas.microsoft.com/office/drawing/2014/main" id="{0385A3AB-B258-4D59-B407-F7D57545A163}"/>
+              </a:ext>
+            </a:extLst>
+          </p:cNvPr>
+          <p:cNvSpPr>
+            <a:spLocks noGrp="1"/>
+          </p:cNvSpPr>
+          <p:nvPr>
+            <p:ph idx="1"/>
+          </p:nvPr>
+        </p:nvSpPr>
+        <p:spPr>
+          <a:xfrm>
+            <a:off x="365760" y="862719"/>
+            <a:ext cx="11369809" cy="4047778"/>
+          </a:xfrm>
+        </p:spPr>
+        <p:txBody>
+          <a:bodyPr/>
+          <a:lstStyle/>
+          <a:p>
+            <a:pPr marL="0" indent="0">
+              <a:buNone/>
+            </a:pPr>
+            <a:endParaRPr lang="en-US" sz="2000" b="1" dirty="0"/>
+          </a:p>
+          <a:p>
+            <a:pPr marL="0" indent="0">
+              <a:buNone/>
+            </a:pPr>
+            <a:r>
+              <a:rPr lang="en-US" sz="2000" b="1" dirty="0"/>
+              <a:t>License and Citation</a:t>
+            </a:r>
+          </a:p>
+          <a:p>
+            <a:pPr>
+              <a:spcBef>
+                <a:spcPts val="400"/>
+              </a:spcBef>
+            </a:pPr>
+            <a:r>
+              <a:rPr lang="en-US" sz="1800" b="1" dirty="0"/>
+              <a:t>The requested citation for this module is: Anshu Dubey, Scientific Software Design, Scientific Software Track, in Argonne Training Program for Extreme Scale Computing. DOI:</a:t>
+            </a:r>
+            <a:endParaRPr lang="en-US" sz="1800" dirty="0"/>
+          </a:p>
+          <a:p>
+            <a:pPr marL="0" indent="0">
+              <a:buNone/>
+            </a:pPr>
+            <a:endParaRPr lang="en-US" sz="2000" b="1" dirty="0"/>
+          </a:p>
+          <a:p>
+            <a:pPr marL="0" indent="0">
+              <a:buNone/>
+            </a:pPr>
+            <a:r>
+              <a:rPr lang="en-US" sz="2000" b="1" dirty="0"/>
+              <a:t>Acknowledgements</a:t>
+            </a:r>
+          </a:p>
+          <a:p>
+            <a:pPr>
+              <a:spcBef>
+                <a:spcPts val="600"/>
+              </a:spcBef>
+            </a:pPr>
+            <a:r>
+              <a:rPr lang="en-US" sz="1600" dirty="0"/>
+              <a:t>This work was performed in part at the Argonne National Laboratory, which is managed by </a:t>
+            </a:r>
+            <a:r>
+              <a:rPr lang="en-US" sz="1600" dirty="0" err="1"/>
+              <a:t>UChicago</a:t>
+            </a:r>
+            <a:r>
+              <a:rPr lang="en-US" sz="1600" dirty="0"/>
+              <a:t> Argonne, LLC for the U.S. Department of Energy under Contract No. DE-AC02-06CH11357.</a:t>
+            </a:r>
+          </a:p>
+        </p:txBody>
+      </p:sp>
+      <p:pic>
+        <p:nvPicPr>
+          <p:cNvPr id="4" name="Picture 2" descr="https://licensebuttons.net/l/by/4.0/88x31.png">
+            <a:extLst>
+              <a:ext uri="{FF2B5EF4-FFF2-40B4-BE49-F238E27FC236}">
+                <a16:creationId xmlns:a16="http://schemas.microsoft.com/office/drawing/2014/main" id="{61840015-22A0-4634-A2DE-AA05F998FD3A}"/>
+              </a:ext>
+            </a:extLst>
+          </p:cNvPr>
+          <p:cNvPicPr>
+            <a:picLocks noChangeAspect="1" noChangeArrowheads="1"/>
+          </p:cNvPicPr>
+          <p:nvPr/>
+        </p:nvPicPr>
+        <p:blipFill>
+          <a:blip r:embed="rId2">
+            <a:extLst>
+              <a:ext uri="{28A0092B-C50C-407E-A947-70E740481C1C}">
+                <a14:useLocalDpi xmlns:a14="http://schemas.microsoft.com/office/drawing/2010/main" val="0"/>
+              </a:ext>
+            </a:extLst>
+          </a:blip>
+          <a:srcRect/>
+          <a:stretch>
+            <a:fillRect/>
+          </a:stretch>
+        </p:blipFill>
+        <p:spPr bwMode="auto">
+          <a:xfrm>
+            <a:off x="10249254" y="570111"/>
+            <a:ext cx="1661258" cy="585216"/>
+          </a:xfrm>
+          <a:prstGeom prst="rect">
+            <a:avLst/>
+          </a:prstGeom>
+          <a:noFill/>
+          <a:extLst>
+            <a:ext uri="{909E8E84-426E-40DD-AFC4-6F175D3DCCD1}">
+              <a14:hiddenFill xmlns:a14="http://schemas.microsoft.com/office/drawing/2010/main">
+                <a:solidFill>
+                  <a:srgbClr val="FFFFFF"/>
+                </a:solidFill>
+              </a14:hiddenFill>
+            </a:ext>
+          </a:extLst>
+        </p:spPr>
+      </p:pic>
+    </p:spTree>
+    <p:extLst>
+      <p:ext uri="{BB962C8B-B14F-4D97-AF65-F5344CB8AC3E}">
+        <p14:creationId xmlns:p14="http://schemas.microsoft.com/office/powerpoint/2010/main" val="580800856"/>
+      </p:ext>
+    </p:extLst>
+  </p:cSld>
+  <p:clrMapOvr>
+    <a:masterClrMapping/>
+  </p:clrMapOvr>
+</p:sld>
+</file>
+
+<file path=ppt/slides/slide30.xml><?xml version="1.0" encoding="utf-8"?>
 <p:sld xmlns:a="http://schemas.openxmlformats.org/drawingml/2006/main" xmlns:r="http://schemas.openxmlformats.org/officeDocument/2006/relationships" xmlns:p="http://schemas.openxmlformats.org/presentationml/2006/main">
   <p:cSld>
     <p:spTree>
@@ -22922,204 +23471,6 @@
 </p:sld>
 </file>
 
-<file path=ppt/slides/slide3.xml><?xml version="1.0" encoding="utf-8"?>
-<p:sld xmlns:a="http://schemas.openxmlformats.org/drawingml/2006/main" xmlns:r="http://schemas.openxmlformats.org/officeDocument/2006/relationships" xmlns:p="http://schemas.openxmlformats.org/presentationml/2006/main">
-  <p:cSld>
-    <p:spTree>
-      <p:nvGrpSpPr>
-        <p:cNvPr id="1" name=""/>
-        <p:cNvGrpSpPr/>
-        <p:nvPr/>
-      </p:nvGrpSpPr>
-      <p:grpSpPr>
-        <a:xfrm>
-          <a:off x="0" y="0"/>
-          <a:ext cx="0" cy="0"/>
-          <a:chOff x="0" y="0"/>
-          <a:chExt cx="0" cy="0"/>
-        </a:xfrm>
-      </p:grpSpPr>
-      <p:sp>
-        <p:nvSpPr>
-          <p:cNvPr id="2" name="Title 1"/>
-          <p:cNvSpPr>
-            <a:spLocks noGrp="1"/>
-          </p:cNvSpPr>
-          <p:nvPr>
-            <p:ph type="title"/>
-          </p:nvPr>
-        </p:nvSpPr>
-        <p:spPr/>
-        <p:txBody>
-          <a:bodyPr/>
-          <a:lstStyle/>
-          <a:p>
-            <a:r>
-              <a:rPr lang="en-US" dirty="0"/>
-              <a:t>Architecting scientific codes</a:t>
-            </a:r>
-          </a:p>
-        </p:txBody>
-      </p:sp>
-      <p:sp>
-        <p:nvSpPr>
-          <p:cNvPr id="3" name="Content Placeholder 2"/>
-          <p:cNvSpPr>
-            <a:spLocks noGrp="1"/>
-          </p:cNvSpPr>
-          <p:nvPr>
-            <p:ph idx="1"/>
-          </p:nvPr>
-        </p:nvSpPr>
-        <p:spPr>
-          <a:xfrm>
-            <a:off x="943443" y="966203"/>
-            <a:ext cx="10693385" cy="359677"/>
-          </a:xfrm>
-        </p:spPr>
-        <p:txBody>
-          <a:bodyPr/>
-          <a:lstStyle/>
-          <a:p>
-            <a:pPr marL="0" indent="0">
-              <a:buNone/>
-            </a:pPr>
-            <a:r>
-              <a:rPr lang="en-US" sz="2400" b="1" dirty="0"/>
-              <a:t>Desirable Characteristics and Why They are Challenging</a:t>
-            </a:r>
-          </a:p>
-          <a:p>
-            <a:pPr lvl="1"/>
-            <a:endParaRPr lang="en-US" dirty="0"/>
-          </a:p>
-        </p:txBody>
-      </p:sp>
-      <p:sp>
-        <p:nvSpPr>
-          <p:cNvPr id="5" name="TextBox 4">
-            <a:extLst>
-              <a:ext uri="{FF2B5EF4-FFF2-40B4-BE49-F238E27FC236}">
-                <a16:creationId xmlns:a16="http://schemas.microsoft.com/office/drawing/2014/main" id="{D8F3DAED-9D71-7A4D-ABCE-BAD854522A99}"/>
-              </a:ext>
-            </a:extLst>
-          </p:cNvPr>
-          <p:cNvSpPr txBox="1"/>
-          <p:nvPr/>
-        </p:nvSpPr>
-        <p:spPr>
-          <a:xfrm>
-            <a:off x="2198917" y="1446638"/>
-            <a:ext cx="1458348" cy="433965"/>
-          </a:xfrm>
-          <a:prstGeom prst="rect">
-            <a:avLst/>
-          </a:prstGeom>
-          <a:noFill/>
-        </p:spPr>
-        <p:txBody>
-          <a:bodyPr wrap="none" lIns="118872" tIns="91440" rIns="118872" bIns="91440" rtlCol="0" anchor="ctr" anchorCtr="0">
-            <a:spAutoFit/>
-          </a:bodyPr>
-          <a:lstStyle/>
-          <a:p>
-            <a:pPr algn="l">
-              <a:lnSpc>
-                <a:spcPct val="90000"/>
-              </a:lnSpc>
-            </a:pPr>
-            <a:r>
-              <a:rPr lang="en-US" dirty="0"/>
-              <a:t>Extensibility</a:t>
-            </a:r>
-          </a:p>
-        </p:txBody>
-      </p:sp>
-      <p:sp>
-        <p:nvSpPr>
-          <p:cNvPr id="7" name="Rounded Rectangle 6">
-            <a:extLst>
-              <a:ext uri="{FF2B5EF4-FFF2-40B4-BE49-F238E27FC236}">
-                <a16:creationId xmlns:a16="http://schemas.microsoft.com/office/drawing/2014/main" id="{AB8C5454-7C3C-364A-9FC0-FAB9903FB673}"/>
-              </a:ext>
-            </a:extLst>
-          </p:cNvPr>
-          <p:cNvSpPr/>
-          <p:nvPr/>
-        </p:nvSpPr>
-        <p:spPr>
-          <a:xfrm>
-            <a:off x="1304596" y="2056199"/>
-            <a:ext cx="3408917" cy="1699372"/>
-          </a:xfrm>
-          <a:prstGeom prst="roundRect">
-            <a:avLst/>
-          </a:prstGeom>
-          <a:solidFill>
-            <a:schemeClr val="accent1"/>
-          </a:solidFill>
-          <a:ln>
-            <a:noFill/>
-          </a:ln>
-          <a:effectLst>
-            <a:outerShdw blurRad="44450" dist="27940" dir="5400000" algn="ctr">
-              <a:srgbClr val="000000">
-                <a:alpha val="32000"/>
-              </a:srgbClr>
-            </a:outerShdw>
-          </a:effectLst>
-        </p:spPr>
-        <p:txBody>
-          <a:bodyPr rot="0" spcFirstLastPara="0" vertOverflow="overflow" horzOverflow="overflow" vert="horz" wrap="square" lIns="121851" tIns="60925" rIns="121851" bIns="60925" numCol="1" spcCol="0" rtlCol="0" fromWordArt="0" anchor="ctr" anchorCtr="0" forceAA="0" compatLnSpc="1">
-            <a:prstTxWarp prst="textNoShape">
-              <a:avLst/>
-            </a:prstTxWarp>
-            <a:noAutofit/>
-          </a:bodyPr>
-          <a:lstStyle/>
-          <a:p>
-            <a:pPr algn="ctr"/>
-            <a:r>
-              <a:rPr lang="en-US" sz="2000" dirty="0">
-                <a:solidFill>
-                  <a:schemeClr val="tx2">
-                    <a:lumMod val="20000"/>
-                    <a:lumOff val="80000"/>
-                  </a:schemeClr>
-                </a:solidFill>
-              </a:rPr>
-              <a:t>Well defined structure and modules </a:t>
-            </a:r>
-          </a:p>
-          <a:p>
-            <a:pPr algn="ctr"/>
-            <a:r>
-              <a:rPr lang="en-US" sz="2000" dirty="0">
-                <a:solidFill>
-                  <a:schemeClr val="tx2">
-                    <a:lumMod val="20000"/>
-                    <a:lumOff val="80000"/>
-                  </a:schemeClr>
-                </a:solidFill>
-              </a:rPr>
-              <a:t>Encapsulation of functionalities</a:t>
-            </a:r>
-          </a:p>
-        </p:txBody>
-      </p:sp>
-    </p:spTree>
-    <p:extLst>
-      <p:ext uri="{BB962C8B-B14F-4D97-AF65-F5344CB8AC3E}">
-        <p14:creationId xmlns:p14="http://schemas.microsoft.com/office/powerpoint/2010/main" val="718866651"/>
-      </p:ext>
-    </p:extLst>
-  </p:cSld>
-  <p:clrMapOvr>
-    <a:masterClrMapping/>
-  </p:clrMapOvr>
-</p:sld>
-</file>
-
 <file path=ppt/slides/slide4.xml><?xml version="1.0" encoding="utf-8"?>
 <p:sld xmlns:a="http://schemas.openxmlformats.org/drawingml/2006/main" xmlns:r="http://schemas.openxmlformats.org/officeDocument/2006/relationships" xmlns:p="http://schemas.openxmlformats.org/presentationml/2006/main">
   <p:cSld>
@@ -23305,68 +23656,10 @@
           </a:p>
         </p:txBody>
       </p:sp>
-      <p:sp>
-        <p:nvSpPr>
-          <p:cNvPr id="18" name="Rounded Rectangle 17">
-            <a:extLst>
-              <a:ext uri="{FF2B5EF4-FFF2-40B4-BE49-F238E27FC236}">
-                <a16:creationId xmlns:a16="http://schemas.microsoft.com/office/drawing/2014/main" id="{FD262230-1681-AF4E-B2F0-AFBCC7A193BF}"/>
-              </a:ext>
-            </a:extLst>
-          </p:cNvPr>
-          <p:cNvSpPr/>
-          <p:nvPr/>
-        </p:nvSpPr>
-        <p:spPr>
-          <a:xfrm>
-            <a:off x="1326032" y="4023360"/>
-            <a:ext cx="3408917" cy="1699372"/>
-          </a:xfrm>
-          <a:prstGeom prst="roundRect">
-            <a:avLst/>
-          </a:prstGeom>
-          <a:solidFill>
-            <a:schemeClr val="tx2">
-              <a:lumMod val="20000"/>
-              <a:lumOff val="80000"/>
-            </a:schemeClr>
-          </a:solidFill>
-          <a:ln>
-            <a:noFill/>
-          </a:ln>
-          <a:effectLst>
-            <a:outerShdw blurRad="44450" dist="27940" dir="5400000" algn="ctr">
-              <a:srgbClr val="000000">
-                <a:alpha val="32000"/>
-              </a:srgbClr>
-            </a:outerShdw>
-          </a:effectLst>
-        </p:spPr>
-        <p:txBody>
-          <a:bodyPr rot="0" spcFirstLastPara="0" vertOverflow="overflow" horzOverflow="overflow" vert="horz" wrap="square" lIns="121851" tIns="60925" rIns="121851" bIns="60925" numCol="1" spcCol="0" rtlCol="0" fromWordArt="0" anchor="ctr" anchorCtr="0" forceAA="0" compatLnSpc="1">
-            <a:prstTxWarp prst="textNoShape">
-              <a:avLst/>
-            </a:prstTxWarp>
-            <a:noAutofit/>
-          </a:bodyPr>
-          <a:lstStyle/>
-          <a:p>
-            <a:pPr algn="ctr"/>
-            <a:r>
-              <a:rPr lang="en-US" sz="2000" dirty="0">
-                <a:solidFill>
-                  <a:schemeClr val="accent1"/>
-                </a:solidFill>
-              </a:rPr>
-              <a:t>Same data layout not good for all solvers. Many corner cases. Necessary lateral interactions</a:t>
-            </a:r>
-          </a:p>
-        </p:txBody>
-      </p:sp>
     </p:spTree>
     <p:extLst>
       <p:ext uri="{BB962C8B-B14F-4D97-AF65-F5344CB8AC3E}">
-        <p14:creationId xmlns:p14="http://schemas.microsoft.com/office/powerpoint/2010/main" val="3811306476"/>
+        <p14:creationId xmlns:p14="http://schemas.microsoft.com/office/powerpoint/2010/main" val="718866651"/>
       </p:ext>
     </p:extLst>
   </p:cSld>
@@ -23491,46 +23784,6 @@
       </p:sp>
       <p:sp>
         <p:nvSpPr>
-          <p:cNvPr id="15" name="TextBox 14">
-            <a:extLst>
-              <a:ext uri="{FF2B5EF4-FFF2-40B4-BE49-F238E27FC236}">
-                <a16:creationId xmlns:a16="http://schemas.microsoft.com/office/drawing/2014/main" id="{C78BF2DB-319B-F146-B7A1-BC81DCB8504A}"/>
-              </a:ext>
-            </a:extLst>
-          </p:cNvPr>
-          <p:cNvSpPr txBox="1"/>
-          <p:nvPr/>
-        </p:nvSpPr>
-        <p:spPr>
-          <a:xfrm>
-            <a:off x="6493235" y="1446637"/>
-            <a:ext cx="1560940" cy="433965"/>
-          </a:xfrm>
-          <a:prstGeom prst="rect">
-            <a:avLst/>
-          </a:prstGeom>
-          <a:noFill/>
-        </p:spPr>
-        <p:txBody>
-          <a:bodyPr wrap="none" lIns="118872" tIns="91440" rIns="118872" bIns="91440" rtlCol="0" anchor="ctr" anchorCtr="0">
-            <a:spAutoFit/>
-          </a:bodyPr>
-          <a:lstStyle/>
-          <a:p>
-            <a:pPr algn="l">
-              <a:lnSpc>
-                <a:spcPct val="90000"/>
-              </a:lnSpc>
-            </a:pPr>
-            <a:r>
-              <a:rPr lang="en-US" dirty="0"/>
-              <a:t>Performance</a:t>
-            </a:r>
-          </a:p>
-        </p:txBody>
-      </p:sp>
-      <p:sp>
-        <p:nvSpPr>
           <p:cNvPr id="7" name="Rounded Rectangle 6">
             <a:extLst>
               <a:ext uri="{FF2B5EF4-FFF2-40B4-BE49-F238E27FC236}">
@@ -23603,96 +23856,10 @@
       </p:sp>
       <p:sp>
         <p:nvSpPr>
-          <p:cNvPr id="17" name="Rounded Rectangle 16">
+          <p:cNvPr id="18" name="Rounded Rectangle 17">
             <a:extLst>
               <a:ext uri="{FF2B5EF4-FFF2-40B4-BE49-F238E27FC236}">
-                <a16:creationId xmlns:a16="http://schemas.microsoft.com/office/drawing/2014/main" id="{E92879B7-905C-BB44-A527-1A213FF082AB}"/>
-              </a:ext>
-            </a:extLst>
-          </p:cNvPr>
-          <p:cNvSpPr/>
-          <p:nvPr/>
-        </p:nvSpPr>
-        <p:spPr>
-          <a:xfrm>
-            <a:off x="5420146" y="2032815"/>
-            <a:ext cx="3408917" cy="1699372"/>
-          </a:xfrm>
-          <a:prstGeom prst="roundRect">
-            <a:avLst/>
-          </a:prstGeom>
-          <a:solidFill>
-            <a:schemeClr val="accent1"/>
-          </a:solidFill>
-          <a:ln>
-            <a:noFill/>
-          </a:ln>
-          <a:effectLst>
-            <a:outerShdw blurRad="44450" dist="27940" dir="5400000" algn="ctr">
-              <a:srgbClr val="000000">
-                <a:alpha val="32000"/>
-              </a:srgbClr>
-            </a:outerShdw>
-          </a:effectLst>
-        </p:spPr>
-        <p:txBody>
-          <a:bodyPr rot="0" spcFirstLastPara="0" vertOverflow="overflow" horzOverflow="overflow" vert="horz" wrap="square" lIns="121851" tIns="60925" rIns="121851" bIns="60925" numCol="1" spcCol="0" rtlCol="0" fromWordArt="0" anchor="ctr" anchorCtr="0" forceAA="0" compatLnSpc="1">
-            <a:prstTxWarp prst="textNoShape">
-              <a:avLst/>
-            </a:prstTxWarp>
-            <a:noAutofit/>
-          </a:bodyPr>
-          <a:lstStyle/>
-          <a:p>
-            <a:pPr algn="ctr"/>
-            <a:r>
-              <a:rPr lang="en-US" sz="2000" dirty="0">
-                <a:solidFill>
-                  <a:schemeClr val="tx2">
-                    <a:lumMod val="20000"/>
-                    <a:lumOff val="80000"/>
-                  </a:schemeClr>
-                </a:solidFill>
-              </a:rPr>
-              <a:t>Spatial and temporal locality of data</a:t>
-            </a:r>
-          </a:p>
-          <a:p>
-            <a:pPr algn="ctr"/>
-            <a:r>
-              <a:rPr lang="en-US" sz="2000" dirty="0">
-                <a:solidFill>
-                  <a:schemeClr val="tx2">
-                    <a:lumMod val="20000"/>
-                    <a:lumOff val="80000"/>
-                  </a:schemeClr>
-                </a:solidFill>
-              </a:rPr>
-              <a:t>Minimizing data movement</a:t>
-            </a:r>
-          </a:p>
-          <a:p>
-            <a:pPr algn="ctr"/>
-            <a:r>
-              <a:rPr lang="en-US" sz="2000" dirty="0">
-                <a:solidFill>
-                  <a:schemeClr val="tx2">
-                    <a:lumMod val="20000"/>
-                    <a:lumOff val="80000"/>
-                  </a:schemeClr>
-                </a:solidFill>
-              </a:rPr>
-              <a:t>Maximizing scalability</a:t>
-            </a:r>
-          </a:p>
-        </p:txBody>
-      </p:sp>
-      <p:sp>
-        <p:nvSpPr>
-          <p:cNvPr id="8" name="Rounded Rectangle 7">
-            <a:extLst>
-              <a:ext uri="{FF2B5EF4-FFF2-40B4-BE49-F238E27FC236}">
-                <a16:creationId xmlns:a16="http://schemas.microsoft.com/office/drawing/2014/main" id="{1FE254B2-1CC5-D64F-B786-05C76F3D55AE}"/>
+                <a16:creationId xmlns:a16="http://schemas.microsoft.com/office/drawing/2014/main" id="{FD262230-1681-AF4E-B2F0-AFBCC7A193BF}"/>
               </a:ext>
             </a:extLst>
           </p:cNvPr>
@@ -23748,7 +23915,7 @@
     </p:spTree>
     <p:extLst>
       <p:ext uri="{BB962C8B-B14F-4D97-AF65-F5344CB8AC3E}">
-        <p14:creationId xmlns:p14="http://schemas.microsoft.com/office/powerpoint/2010/main" val="927348338"/>
+        <p14:creationId xmlns:p14="http://schemas.microsoft.com/office/powerpoint/2010/main" val="3811306476"/>
       </p:ext>
     </p:extLst>
   </p:cSld>
@@ -24071,10 +24238,10 @@
       </p:sp>
       <p:sp>
         <p:nvSpPr>
-          <p:cNvPr id="18" name="Rounded Rectangle 17">
+          <p:cNvPr id="8" name="Rounded Rectangle 7">
             <a:extLst>
               <a:ext uri="{FF2B5EF4-FFF2-40B4-BE49-F238E27FC236}">
-                <a16:creationId xmlns:a16="http://schemas.microsoft.com/office/drawing/2014/main" id="{FD262230-1681-AF4E-B2F0-AFBCC7A193BF}"/>
+                <a16:creationId xmlns:a16="http://schemas.microsoft.com/office/drawing/2014/main" id="{1FE254B2-1CC5-D64F-B786-05C76F3D55AE}"/>
               </a:ext>
             </a:extLst>
           </p:cNvPr>
@@ -24127,68 +24294,10 @@
           </a:p>
         </p:txBody>
       </p:sp>
-      <p:sp>
-        <p:nvSpPr>
-          <p:cNvPr id="19" name="Rounded Rectangle 18">
-            <a:extLst>
-              <a:ext uri="{FF2B5EF4-FFF2-40B4-BE49-F238E27FC236}">
-                <a16:creationId xmlns:a16="http://schemas.microsoft.com/office/drawing/2014/main" id="{2862F1BC-F846-224E-B085-B39237C0FAC1}"/>
-              </a:ext>
-            </a:extLst>
-          </p:cNvPr>
-          <p:cNvSpPr/>
-          <p:nvPr/>
-        </p:nvSpPr>
-        <p:spPr>
-          <a:xfrm>
-            <a:off x="5420147" y="4023360"/>
-            <a:ext cx="3408917" cy="1699372"/>
-          </a:xfrm>
-          <a:prstGeom prst="roundRect">
-            <a:avLst/>
-          </a:prstGeom>
-          <a:solidFill>
-            <a:schemeClr val="tx2">
-              <a:lumMod val="20000"/>
-              <a:lumOff val="80000"/>
-            </a:schemeClr>
-          </a:solidFill>
-          <a:ln>
-            <a:noFill/>
-          </a:ln>
-          <a:effectLst>
-            <a:outerShdw blurRad="44450" dist="27940" dir="5400000" algn="ctr">
-              <a:srgbClr val="000000">
-                <a:alpha val="32000"/>
-              </a:srgbClr>
-            </a:outerShdw>
-          </a:effectLst>
-        </p:spPr>
-        <p:txBody>
-          <a:bodyPr rot="0" spcFirstLastPara="0" vertOverflow="overflow" horzOverflow="overflow" vert="horz" wrap="square" lIns="121851" tIns="60925" rIns="121851" bIns="60925" numCol="1" spcCol="0" rtlCol="0" fromWordArt="0" anchor="ctr" anchorCtr="0" forceAA="0" compatLnSpc="1">
-            <a:prstTxWarp prst="textNoShape">
-              <a:avLst/>
-            </a:prstTxWarp>
-            <a:noAutofit/>
-          </a:bodyPr>
-          <a:lstStyle/>
-          <a:p>
-            <a:pPr algn="ctr"/>
-            <a:r>
-              <a:rPr lang="en-US" sz="2000" dirty="0">
-                <a:solidFill>
-                  <a:schemeClr val="accent1"/>
-                </a:solidFill>
-              </a:rPr>
-              <a:t>Low arithmetic intensity solvers with hard dependencies. Proximity and work distribution at cross purposes</a:t>
-            </a:r>
-          </a:p>
-        </p:txBody>
-      </p:sp>
     </p:spTree>
     <p:extLst>
       <p:ext uri="{BB962C8B-B14F-4D97-AF65-F5344CB8AC3E}">
-        <p14:creationId xmlns:p14="http://schemas.microsoft.com/office/powerpoint/2010/main" val="4258597434"/>
+        <p14:creationId xmlns:p14="http://schemas.microsoft.com/office/powerpoint/2010/main" val="927348338"/>
       </p:ext>
     </p:extLst>
   </p:cSld>
@@ -24286,7 +24395,7 @@
         <p:spPr>
           <a:xfrm>
             <a:off x="2198917" y="1446638"/>
-            <a:ext cx="1253164" cy="433965"/>
+            <a:ext cx="1458348" cy="433965"/>
           </a:xfrm>
           <a:prstGeom prst="rect">
             <a:avLst/>
@@ -24306,7 +24415,47 @@
             </a:pPr>
             <a:r>
               <a:rPr lang="en-US" dirty="0"/>
-              <a:t>Portability</a:t>
+              <a:t>Extensibility</a:t>
+            </a:r>
+          </a:p>
+        </p:txBody>
+      </p:sp>
+      <p:sp>
+        <p:nvSpPr>
+          <p:cNvPr id="15" name="TextBox 14">
+            <a:extLst>
+              <a:ext uri="{FF2B5EF4-FFF2-40B4-BE49-F238E27FC236}">
+                <a16:creationId xmlns:a16="http://schemas.microsoft.com/office/drawing/2014/main" id="{C78BF2DB-319B-F146-B7A1-BC81DCB8504A}"/>
+              </a:ext>
+            </a:extLst>
+          </p:cNvPr>
+          <p:cNvSpPr txBox="1"/>
+          <p:nvPr/>
+        </p:nvSpPr>
+        <p:spPr>
+          <a:xfrm>
+            <a:off x="6493235" y="1446637"/>
+            <a:ext cx="1560940" cy="433965"/>
+          </a:xfrm>
+          <a:prstGeom prst="rect">
+            <a:avLst/>
+          </a:prstGeom>
+          <a:noFill/>
+        </p:spPr>
+        <p:txBody>
+          <a:bodyPr wrap="none" lIns="118872" tIns="91440" rIns="118872" bIns="91440" rtlCol="0" anchor="ctr" anchorCtr="0">
+            <a:spAutoFit/>
+          </a:bodyPr>
+          <a:lstStyle/>
+          <a:p>
+            <a:pPr algn="l">
+              <a:lnSpc>
+                <a:spcPct val="90000"/>
+              </a:lnSpc>
+            </a:pPr>
+            <a:r>
+              <a:rPr lang="en-US" dirty="0"/>
+              <a:t>Performance</a:t>
             </a:r>
           </a:p>
         </p:txBody>
@@ -24364,7 +24513,223 @@
                   </a:schemeClr>
                 </a:solidFill>
               </a:rPr>
-              <a:t>General solutions that work without significant manual intervention across platforms</a:t>
+              <a:t>Well defined structure and modules </a:t>
+            </a:r>
+          </a:p>
+          <a:p>
+            <a:pPr algn="ctr"/>
+            <a:r>
+              <a:rPr lang="en-US" sz="2000" dirty="0">
+                <a:solidFill>
+                  <a:schemeClr val="tx2">
+                    <a:lumMod val="20000"/>
+                    <a:lumOff val="80000"/>
+                  </a:schemeClr>
+                </a:solidFill>
+              </a:rPr>
+              <a:t>Encapsulation of functionalities</a:t>
+            </a:r>
+          </a:p>
+        </p:txBody>
+      </p:sp>
+      <p:sp>
+        <p:nvSpPr>
+          <p:cNvPr id="17" name="Rounded Rectangle 16">
+            <a:extLst>
+              <a:ext uri="{FF2B5EF4-FFF2-40B4-BE49-F238E27FC236}">
+                <a16:creationId xmlns:a16="http://schemas.microsoft.com/office/drawing/2014/main" id="{E92879B7-905C-BB44-A527-1A213FF082AB}"/>
+              </a:ext>
+            </a:extLst>
+          </p:cNvPr>
+          <p:cNvSpPr/>
+          <p:nvPr/>
+        </p:nvSpPr>
+        <p:spPr>
+          <a:xfrm>
+            <a:off x="5420146" y="2032815"/>
+            <a:ext cx="3408917" cy="1699372"/>
+          </a:xfrm>
+          <a:prstGeom prst="roundRect">
+            <a:avLst/>
+          </a:prstGeom>
+          <a:solidFill>
+            <a:schemeClr val="accent1"/>
+          </a:solidFill>
+          <a:ln>
+            <a:noFill/>
+          </a:ln>
+          <a:effectLst>
+            <a:outerShdw blurRad="44450" dist="27940" dir="5400000" algn="ctr">
+              <a:srgbClr val="000000">
+                <a:alpha val="32000"/>
+              </a:srgbClr>
+            </a:outerShdw>
+          </a:effectLst>
+        </p:spPr>
+        <p:txBody>
+          <a:bodyPr rot="0" spcFirstLastPara="0" vertOverflow="overflow" horzOverflow="overflow" vert="horz" wrap="square" lIns="121851" tIns="60925" rIns="121851" bIns="60925" numCol="1" spcCol="0" rtlCol="0" fromWordArt="0" anchor="ctr" anchorCtr="0" forceAA="0" compatLnSpc="1">
+            <a:prstTxWarp prst="textNoShape">
+              <a:avLst/>
+            </a:prstTxWarp>
+            <a:noAutofit/>
+          </a:bodyPr>
+          <a:lstStyle/>
+          <a:p>
+            <a:pPr algn="ctr"/>
+            <a:r>
+              <a:rPr lang="en-US" sz="2000" dirty="0">
+                <a:solidFill>
+                  <a:schemeClr val="tx2">
+                    <a:lumMod val="20000"/>
+                    <a:lumOff val="80000"/>
+                  </a:schemeClr>
+                </a:solidFill>
+              </a:rPr>
+              <a:t>Spatial and temporal locality of data</a:t>
+            </a:r>
+          </a:p>
+          <a:p>
+            <a:pPr algn="ctr"/>
+            <a:r>
+              <a:rPr lang="en-US" sz="2000" dirty="0">
+                <a:solidFill>
+                  <a:schemeClr val="tx2">
+                    <a:lumMod val="20000"/>
+                    <a:lumOff val="80000"/>
+                  </a:schemeClr>
+                </a:solidFill>
+              </a:rPr>
+              <a:t>Minimizing data movement</a:t>
+            </a:r>
+          </a:p>
+          <a:p>
+            <a:pPr algn="ctr"/>
+            <a:r>
+              <a:rPr lang="en-US" sz="2000" dirty="0">
+                <a:solidFill>
+                  <a:schemeClr val="tx2">
+                    <a:lumMod val="20000"/>
+                    <a:lumOff val="80000"/>
+                  </a:schemeClr>
+                </a:solidFill>
+              </a:rPr>
+              <a:t>Maximizing scalability</a:t>
+            </a:r>
+          </a:p>
+        </p:txBody>
+      </p:sp>
+      <p:sp>
+        <p:nvSpPr>
+          <p:cNvPr id="18" name="Rounded Rectangle 17">
+            <a:extLst>
+              <a:ext uri="{FF2B5EF4-FFF2-40B4-BE49-F238E27FC236}">
+                <a16:creationId xmlns:a16="http://schemas.microsoft.com/office/drawing/2014/main" id="{FD262230-1681-AF4E-B2F0-AFBCC7A193BF}"/>
+              </a:ext>
+            </a:extLst>
+          </p:cNvPr>
+          <p:cNvSpPr/>
+          <p:nvPr/>
+        </p:nvSpPr>
+        <p:spPr>
+          <a:xfrm>
+            <a:off x="1326032" y="4023360"/>
+            <a:ext cx="3408917" cy="1699372"/>
+          </a:xfrm>
+          <a:prstGeom prst="roundRect">
+            <a:avLst/>
+          </a:prstGeom>
+          <a:solidFill>
+            <a:schemeClr val="tx2">
+              <a:lumMod val="20000"/>
+              <a:lumOff val="80000"/>
+            </a:schemeClr>
+          </a:solidFill>
+          <a:ln>
+            <a:noFill/>
+          </a:ln>
+          <a:effectLst>
+            <a:outerShdw blurRad="44450" dist="27940" dir="5400000" algn="ctr">
+              <a:srgbClr val="000000">
+                <a:alpha val="32000"/>
+              </a:srgbClr>
+            </a:outerShdw>
+          </a:effectLst>
+        </p:spPr>
+        <p:txBody>
+          <a:bodyPr rot="0" spcFirstLastPara="0" vertOverflow="overflow" horzOverflow="overflow" vert="horz" wrap="square" lIns="121851" tIns="60925" rIns="121851" bIns="60925" numCol="1" spcCol="0" rtlCol="0" fromWordArt="0" anchor="ctr" anchorCtr="0" forceAA="0" compatLnSpc="1">
+            <a:prstTxWarp prst="textNoShape">
+              <a:avLst/>
+            </a:prstTxWarp>
+            <a:noAutofit/>
+          </a:bodyPr>
+          <a:lstStyle/>
+          <a:p>
+            <a:pPr algn="ctr"/>
+            <a:r>
+              <a:rPr lang="en-US" sz="2000" dirty="0">
+                <a:solidFill>
+                  <a:schemeClr val="accent1"/>
+                </a:solidFill>
+              </a:rPr>
+              <a:t>Same data layout not good for all solvers. Many corner cases. Necessary lateral interactions</a:t>
+            </a:r>
+          </a:p>
+        </p:txBody>
+      </p:sp>
+      <p:sp>
+        <p:nvSpPr>
+          <p:cNvPr id="19" name="Rounded Rectangle 18">
+            <a:extLst>
+              <a:ext uri="{FF2B5EF4-FFF2-40B4-BE49-F238E27FC236}">
+                <a16:creationId xmlns:a16="http://schemas.microsoft.com/office/drawing/2014/main" id="{2862F1BC-F846-224E-B085-B39237C0FAC1}"/>
+              </a:ext>
+            </a:extLst>
+          </p:cNvPr>
+          <p:cNvSpPr/>
+          <p:nvPr/>
+        </p:nvSpPr>
+        <p:spPr>
+          <a:xfrm>
+            <a:off x="5420147" y="4023360"/>
+            <a:ext cx="3408917" cy="1699372"/>
+          </a:xfrm>
+          <a:prstGeom prst="roundRect">
+            <a:avLst/>
+          </a:prstGeom>
+          <a:solidFill>
+            <a:schemeClr val="tx2">
+              <a:lumMod val="20000"/>
+              <a:lumOff val="80000"/>
+            </a:schemeClr>
+          </a:solidFill>
+          <a:ln>
+            <a:noFill/>
+          </a:ln>
+          <a:effectLst>
+            <a:outerShdw blurRad="44450" dist="27940" dir="5400000" algn="ctr">
+              <a:srgbClr val="000000">
+                <a:alpha val="32000"/>
+              </a:srgbClr>
+            </a:outerShdw>
+          </a:effectLst>
+        </p:spPr>
+        <p:txBody>
+          <a:bodyPr rot="0" spcFirstLastPara="0" vertOverflow="overflow" horzOverflow="overflow" vert="horz" wrap="square" lIns="121851" tIns="60925" rIns="121851" bIns="60925" numCol="1" spcCol="0" rtlCol="0" fromWordArt="0" anchor="ctr" anchorCtr="0" forceAA="0" compatLnSpc="1">
+            <a:prstTxWarp prst="textNoShape">
+              <a:avLst/>
+            </a:prstTxWarp>
+            <a:noAutofit/>
+          </a:bodyPr>
+          <a:lstStyle/>
+          <a:p>
+            <a:pPr algn="ctr"/>
+            <a:r>
+              <a:rPr lang="en-US" sz="2000" dirty="0">
+                <a:solidFill>
+                  <a:schemeClr val="accent1"/>
+                </a:solidFill>
+              </a:rPr>
+              <a:t>Low arithmetic intensity solvers with hard dependencies. Proximity and work distribution at cross purposes</a:t>
             </a:r>
           </a:p>
         </p:txBody>
@@ -24372,7 +24737,7 @@
     </p:spTree>
     <p:extLst>
       <p:ext uri="{BB962C8B-B14F-4D97-AF65-F5344CB8AC3E}">
-        <p14:creationId xmlns:p14="http://schemas.microsoft.com/office/powerpoint/2010/main" val="428699451"/>
+        <p14:creationId xmlns:p14="http://schemas.microsoft.com/office/powerpoint/2010/main" val="4258597434"/>
       </p:ext>
     </p:extLst>
   </p:cSld>
@@ -24553,79 +24918,10 @@
           </a:p>
         </p:txBody>
       </p:sp>
-      <p:sp>
-        <p:nvSpPr>
-          <p:cNvPr id="18" name="Rounded Rectangle 17">
-            <a:extLst>
-              <a:ext uri="{FF2B5EF4-FFF2-40B4-BE49-F238E27FC236}">
-                <a16:creationId xmlns:a16="http://schemas.microsoft.com/office/drawing/2014/main" id="{FD262230-1681-AF4E-B2F0-AFBCC7A193BF}"/>
-              </a:ext>
-            </a:extLst>
-          </p:cNvPr>
-          <p:cNvSpPr/>
-          <p:nvPr/>
-        </p:nvSpPr>
-        <p:spPr>
-          <a:xfrm>
-            <a:off x="1326032" y="4023360"/>
-            <a:ext cx="3408917" cy="1699372"/>
-          </a:xfrm>
-          <a:prstGeom prst="roundRect">
-            <a:avLst/>
-          </a:prstGeom>
-          <a:solidFill>
-            <a:schemeClr val="tx2">
-              <a:lumMod val="20000"/>
-              <a:lumOff val="80000"/>
-            </a:schemeClr>
-          </a:solidFill>
-          <a:ln>
-            <a:noFill/>
-          </a:ln>
-          <a:effectLst>
-            <a:outerShdw blurRad="44450" dist="27940" dir="5400000" algn="ctr">
-              <a:srgbClr val="000000">
-                <a:alpha val="32000"/>
-              </a:srgbClr>
-            </a:outerShdw>
-          </a:effectLst>
-        </p:spPr>
-        <p:txBody>
-          <a:bodyPr rot="0" spcFirstLastPara="0" vertOverflow="overflow" horzOverflow="overflow" vert="horz" wrap="square" lIns="121851" tIns="60925" rIns="121851" bIns="60925" numCol="1" spcCol="0" rtlCol="0" fromWordArt="0" anchor="ctr" anchorCtr="0" forceAA="0" compatLnSpc="1">
-            <a:prstTxWarp prst="textNoShape">
-              <a:avLst/>
-            </a:prstTxWarp>
-            <a:noAutofit/>
-          </a:bodyPr>
-          <a:lstStyle/>
-          <a:p>
-            <a:pPr algn="ctr"/>
-            <a:r>
-              <a:rPr lang="en-US" sz="2000" dirty="0">
-                <a:solidFill>
-                  <a:schemeClr val="accent1"/>
-                </a:solidFill>
-              </a:rPr>
-              <a:t>Tremendous platform heterogeneity</a:t>
-            </a:r>
-          </a:p>
-          <a:p>
-            <a:pPr algn="ctr"/>
-            <a:r>
-              <a:rPr lang="en-US" sz="2000" dirty="0">
-                <a:solidFill>
-                  <a:schemeClr val="accent1"/>
-                </a:solidFill>
-              </a:rPr>
-              <a:t>A version for each class of device =&gt; combinatorial explosion</a:t>
-            </a:r>
-          </a:p>
-        </p:txBody>
-      </p:sp>
     </p:spTree>
     <p:extLst>
       <p:ext uri="{BB962C8B-B14F-4D97-AF65-F5344CB8AC3E}">
-        <p14:creationId xmlns:p14="http://schemas.microsoft.com/office/powerpoint/2010/main" val="10116526"/>
+        <p14:creationId xmlns:p14="http://schemas.microsoft.com/office/powerpoint/2010/main" val="428699451"/>
       </p:ext>
     </p:extLst>
   </p:cSld>
@@ -24750,46 +25046,6 @@
       </p:sp>
       <p:sp>
         <p:nvSpPr>
-          <p:cNvPr id="15" name="TextBox 14">
-            <a:extLst>
-              <a:ext uri="{FF2B5EF4-FFF2-40B4-BE49-F238E27FC236}">
-                <a16:creationId xmlns:a16="http://schemas.microsoft.com/office/drawing/2014/main" id="{C78BF2DB-319B-F146-B7A1-BC81DCB8504A}"/>
-              </a:ext>
-            </a:extLst>
-          </p:cNvPr>
-          <p:cNvSpPr txBox="1"/>
-          <p:nvPr/>
-        </p:nvSpPr>
-        <p:spPr>
-          <a:xfrm>
-            <a:off x="5555459" y="1524659"/>
-            <a:ext cx="3317896" cy="433965"/>
-          </a:xfrm>
-          <a:prstGeom prst="rect">
-            <a:avLst/>
-          </a:prstGeom>
-          <a:noFill/>
-        </p:spPr>
-        <p:txBody>
-          <a:bodyPr wrap="none" lIns="118872" tIns="91440" rIns="118872" bIns="91440" rtlCol="0" anchor="ctr" anchorCtr="0">
-            <a:spAutoFit/>
-          </a:bodyPr>
-          <a:lstStyle/>
-          <a:p>
-            <a:pPr algn="l">
-              <a:lnSpc>
-                <a:spcPct val="90000"/>
-              </a:lnSpc>
-            </a:pPr>
-            <a:r>
-              <a:rPr lang="en-US" dirty="0"/>
-              <a:t>Verifiability and Maintainability</a:t>
-            </a:r>
-          </a:p>
-        </p:txBody>
-      </p:sp>
-      <p:sp>
-        <p:nvSpPr>
           <p:cNvPr id="7" name="Rounded Rectangle 6">
             <a:extLst>
               <a:ext uri="{FF2B5EF4-FFF2-40B4-BE49-F238E27FC236}">
@@ -24848,96 +25104,10 @@
       </p:sp>
       <p:sp>
         <p:nvSpPr>
-          <p:cNvPr id="17" name="Rounded Rectangle 16">
+          <p:cNvPr id="18" name="Rounded Rectangle 17">
             <a:extLst>
               <a:ext uri="{FF2B5EF4-FFF2-40B4-BE49-F238E27FC236}">
-                <a16:creationId xmlns:a16="http://schemas.microsoft.com/office/drawing/2014/main" id="{E92879B7-905C-BB44-A527-1A213FF082AB}"/>
-              </a:ext>
-            </a:extLst>
-          </p:cNvPr>
-          <p:cNvSpPr/>
-          <p:nvPr/>
-        </p:nvSpPr>
-        <p:spPr>
-          <a:xfrm>
-            <a:off x="5420146" y="2032815"/>
-            <a:ext cx="3408917" cy="1699372"/>
-          </a:xfrm>
-          <a:prstGeom prst="roundRect">
-            <a:avLst/>
-          </a:prstGeom>
-          <a:solidFill>
-            <a:schemeClr val="accent1"/>
-          </a:solidFill>
-          <a:ln>
-            <a:noFill/>
-          </a:ln>
-          <a:effectLst>
-            <a:outerShdw blurRad="44450" dist="27940" dir="5400000" algn="ctr">
-              <a:srgbClr val="000000">
-                <a:alpha val="32000"/>
-              </a:srgbClr>
-            </a:outerShdw>
-          </a:effectLst>
-        </p:spPr>
-        <p:txBody>
-          <a:bodyPr rot="0" spcFirstLastPara="0" vertOverflow="overflow" horzOverflow="overflow" vert="horz" wrap="square" lIns="121851" tIns="60925" rIns="121851" bIns="60925" numCol="1" spcCol="0" rtlCol="0" fromWordArt="0" anchor="ctr" anchorCtr="0" forceAA="0" compatLnSpc="1">
-            <a:prstTxWarp prst="textNoShape">
-              <a:avLst/>
-            </a:prstTxWarp>
-            <a:noAutofit/>
-          </a:bodyPr>
-          <a:lstStyle/>
-          <a:p>
-            <a:pPr algn="ctr"/>
-            <a:r>
-              <a:rPr lang="en-US" sz="2000" dirty="0">
-                <a:solidFill>
-                  <a:schemeClr val="tx2">
-                    <a:lumMod val="20000"/>
-                    <a:lumOff val="80000"/>
-                  </a:schemeClr>
-                </a:solidFill>
-              </a:rPr>
-              <a:t>Clean code</a:t>
-            </a:r>
-          </a:p>
-          <a:p>
-            <a:pPr algn="ctr"/>
-            <a:r>
-              <a:rPr lang="en-US" sz="2000" dirty="0">
-                <a:solidFill>
-                  <a:schemeClr val="tx2">
-                    <a:lumMod val="20000"/>
-                    <a:lumOff val="80000"/>
-                  </a:schemeClr>
-                </a:solidFill>
-              </a:rPr>
-              <a:t>Documentation</a:t>
-            </a:r>
-          </a:p>
-          <a:p>
-            <a:pPr algn="ctr"/>
-            <a:r>
-              <a:rPr lang="en-US" sz="2000" dirty="0">
-                <a:solidFill>
-                  <a:schemeClr val="tx2">
-                    <a:lumMod val="20000"/>
-                    <a:lumOff val="80000"/>
-                  </a:schemeClr>
-                </a:solidFill>
-              </a:rPr>
-              <a:t>Comprehensive testing</a:t>
-            </a:r>
-          </a:p>
-        </p:txBody>
-      </p:sp>
-      <p:sp>
-        <p:nvSpPr>
-          <p:cNvPr id="8" name="Rounded Rectangle 7">
-            <a:extLst>
-              <a:ext uri="{FF2B5EF4-FFF2-40B4-BE49-F238E27FC236}">
-                <a16:creationId xmlns:a16="http://schemas.microsoft.com/office/drawing/2014/main" id="{3899DF7C-0BE0-0843-BC05-770FAC03F6BE}"/>
+                <a16:creationId xmlns:a16="http://schemas.microsoft.com/office/drawing/2014/main" id="{FD262230-1681-AF4E-B2F0-AFBCC7A193BF}"/>
               </a:ext>
             </a:extLst>
           </p:cNvPr>
@@ -25004,7 +25174,7 @@
     </p:spTree>
     <p:extLst>
       <p:ext uri="{BB962C8B-B14F-4D97-AF65-F5344CB8AC3E}">
-        <p14:creationId xmlns:p14="http://schemas.microsoft.com/office/powerpoint/2010/main" val="197705695"/>
+        <p14:creationId xmlns:p14="http://schemas.microsoft.com/office/powerpoint/2010/main" val="10116526"/>
       </p:ext>
     </p:extLst>
   </p:cSld>
@@ -25927,15 +26097,6 @@
 </file>
 
 <file path=customXml/item1.xml><?xml version="1.0" encoding="utf-8"?>
-<?mso-contentType ?>
-<FormTemplates xmlns="http://schemas.microsoft.com/sharepoint/v3/contenttype/forms">
-  <Display>DocumentLibraryForm</Display>
-  <Edit>DocumentLibraryForm</Edit>
-  <New>DocumentLibraryForm</New>
-</FormTemplates>
-</file>
-
-<file path=customXml/item2.xml><?xml version="1.0" encoding="utf-8"?>
 <ct:contentTypeSchema xmlns:ct="http://schemas.microsoft.com/office/2006/metadata/contentType" xmlns:ma="http://schemas.microsoft.com/office/2006/metadata/properties/metaAttributes" ct:_="" ma:_="" ma:contentTypeName="Document" ma:contentTypeID="0x010100565464437F680748A68B85EB6594EA7D" ma:contentTypeVersion="0" ma:contentTypeDescription="Create a new document." ma:contentTypeScope="" ma:versionID="fe3f4dd58d5914c51cfc6deaa8ad845c">
   <xsd:schema xmlns:xsd="http://www.w3.org/2001/XMLSchema" xmlns:p="http://schemas.microsoft.com/office/2006/metadata/properties" targetNamespace="http://schemas.microsoft.com/office/2006/metadata/properties" ma:root="true" ma:fieldsID="4aeb20c0e3442673af7ee10786458764">
     <xsd:element name="properties">
@@ -25984,6 +26145,15 @@
 </ct:contentTypeSchema>
 </file>
 
+<file path=customXml/item2.xml><?xml version="1.0" encoding="utf-8"?>
+<?mso-contentType ?>
+<FormTemplates xmlns="http://schemas.microsoft.com/sharepoint/v3/contenttype/forms">
+  <Display>DocumentLibraryForm</Display>
+  <Edit>DocumentLibraryForm</Edit>
+  <New>DocumentLibraryForm</New>
+</FormTemplates>
+</file>
+
 <file path=customXml/item3.xml><?xml version="1.0" encoding="utf-8"?>
 <p:properties xmlns:p="http://schemas.microsoft.com/office/2006/metadata/properties" xmlns:xsi="http://www.w3.org/2001/XMLSchema-instance" xmlns:pc="http://schemas.microsoft.com/office/infopath/2007/PartnerControls">
   <documentManagement/>
@@ -25991,14 +26161,6 @@
 </file>
 
 <file path=customXml/itemProps1.xml><?xml version="1.0" encoding="utf-8"?>
-<ds:datastoreItem xmlns:ds="http://schemas.openxmlformats.org/officeDocument/2006/customXml" ds:itemID="{19E20559-B232-4371-8690-E3D8007EDB82}">
-  <ds:schemaRefs>
-    <ds:schemaRef ds:uri="http://schemas.microsoft.com/sharepoint/v3/contenttype/forms"/>
-  </ds:schemaRefs>
-</ds:datastoreItem>
-</file>
-
-<file path=customXml/itemProps2.xml><?xml version="1.0" encoding="utf-8"?>
 <ds:datastoreItem xmlns:ds="http://schemas.openxmlformats.org/officeDocument/2006/customXml" ds:itemID="{E8DB7DEB-074E-4EE8-9B6E-FD277323109C}">
   <ds:schemaRefs>
     <ds:schemaRef ds:uri="http://schemas.microsoft.com/office/2006/metadata/contentType"/>
@@ -26009,6 +26171,14 @@
     <ds:schemaRef ds:uri="http://purl.org/dc/elements/1.1/"/>
     <ds:schemaRef ds:uri="http://purl.org/dc/terms/"/>
     <ds:schemaRef ds:uri="http://schemas.microsoft.com/office/internal/2005/internalDocumentation"/>
+  </ds:schemaRefs>
+</ds:datastoreItem>
+</file>
+
+<file path=customXml/itemProps2.xml><?xml version="1.0" encoding="utf-8"?>
+<ds:datastoreItem xmlns:ds="http://schemas.openxmlformats.org/officeDocument/2006/customXml" ds:itemID="{19E20559-B232-4371-8690-E3D8007EDB82}">
+  <ds:schemaRefs>
+    <ds:schemaRef ds:uri="http://schemas.microsoft.com/sharepoint/v3/contenttype/forms"/>
   </ds:schemaRefs>
 </ds:datastoreItem>
 </file>

</xml_diff>